<commit_message>
retirada dos campos do ppt
</commit_message>
<xml_diff>
--- a/src/main/conv_exames/ppt/base_conv_exames_v2.pptx
+++ b/src/main/conv_exames/ppt/base_conv_exames_v2.pptx
@@ -8490,7 +8490,7 @@
               <a:tabLst/>
               <a:defRPr/>
             </a:pPr>
-            <a:endParaRPr kumimoji="0" lang="pt-BR" sz="1800" b="0" i="0" u="none" strike="noStrike" kern="1200" cap="none" spc="0" normalizeH="0" baseline="0" noProof="0">
+            <a:endParaRPr kumimoji="0" lang="pt-BR" sz="1800" b="0" i="0" u="sng" strike="noStrike" kern="1200" cap="none" spc="0" normalizeH="0" baseline="0" noProof="0">
               <a:ln>
                 <a:noFill/>
               </a:ln>
@@ -8896,617 +8896,6 @@
           </p:txBody>
         </p:sp>
       </p:grpSp>
-      <p:grpSp>
-        <p:nvGrpSpPr>
-          <p:cNvPr id="8" name="Agrupar 7">
-            <a:extLst>
-              <a:ext uri="{FF2B5EF4-FFF2-40B4-BE49-F238E27FC236}">
-                <a16:creationId xmlns:a16="http://schemas.microsoft.com/office/drawing/2014/main" id="{93541CCB-7A09-6458-C159-D220AF73F8DF}"/>
-              </a:ext>
-            </a:extLst>
-          </p:cNvPr>
-          <p:cNvGrpSpPr/>
-          <p:nvPr/>
-        </p:nvGrpSpPr>
-        <p:grpSpPr>
-          <a:xfrm>
-            <a:off x="4818466" y="1082129"/>
-            <a:ext cx="2555068" cy="1325176"/>
-            <a:chOff x="678267" y="1156137"/>
-            <a:chExt cx="2716575" cy="1433983"/>
-          </a:xfrm>
-        </p:grpSpPr>
-        <p:sp>
-          <p:nvSpPr>
-            <p:cNvPr id="9" name="Retângulo: Cantos Arredondados 8">
-              <a:extLst>
-                <a:ext uri="{FF2B5EF4-FFF2-40B4-BE49-F238E27FC236}">
-                  <a16:creationId xmlns:a16="http://schemas.microsoft.com/office/drawing/2014/main" id="{280211BC-2D62-7841-62BC-F2E4AFA2AE6D}"/>
-                </a:ext>
-              </a:extLst>
-            </p:cNvPr>
-            <p:cNvSpPr/>
-            <p:nvPr/>
-          </p:nvSpPr>
-          <p:spPr>
-            <a:xfrm>
-              <a:off x="678267" y="1156137"/>
-              <a:ext cx="2716575" cy="1433983"/>
-            </a:xfrm>
-            <a:prstGeom prst="roundRect">
-              <a:avLst/>
-            </a:prstGeom>
-            <a:solidFill>
-              <a:srgbClr val="EEEFEA"/>
-            </a:solidFill>
-            <a:ln>
-              <a:noFill/>
-            </a:ln>
-          </p:spPr>
-          <p:style>
-            <a:lnRef idx="2">
-              <a:schemeClr val="accent1">
-                <a:shade val="50000"/>
-              </a:schemeClr>
-            </a:lnRef>
-            <a:fillRef idx="1">
-              <a:schemeClr val="accent1"/>
-            </a:fillRef>
-            <a:effectRef idx="0">
-              <a:schemeClr val="accent1"/>
-            </a:effectRef>
-            <a:fontRef idx="minor">
-              <a:schemeClr val="lt1"/>
-            </a:fontRef>
-          </p:style>
-          <p:txBody>
-            <a:bodyPr rtlCol="0" anchor="ctr"/>
-            <a:lstStyle/>
-            <a:p>
-              <a:pPr marL="0" marR="0" lvl="0" indent="0" algn="ctr" defTabSz="914400" rtl="0" eaLnBrk="1" fontAlgn="auto" latinLnBrk="0" hangingPunct="1">
-                <a:lnSpc>
-                  <a:spcPct val="100000"/>
-                </a:lnSpc>
-                <a:spcBef>
-                  <a:spcPts val="0"/>
-                </a:spcBef>
-                <a:spcAft>
-                  <a:spcPts val="0"/>
-                </a:spcAft>
-                <a:buClrTx/>
-                <a:buSzTx/>
-                <a:buFontTx/>
-                <a:buNone/>
-                <a:tabLst/>
-                <a:defRPr/>
-              </a:pPr>
-              <a:endParaRPr kumimoji="0" lang="pt-BR" sz="1800" b="0" i="0" u="none" strike="noStrike" kern="1200" cap="none" spc="0" normalizeH="0" baseline="0" noProof="0">
-                <a:ln>
-                  <a:noFill/>
-                </a:ln>
-                <a:solidFill>
-                  <a:srgbClr val="A5A5A5">
-                    <a:lumMod val="20000"/>
-                    <a:lumOff val="80000"/>
-                  </a:srgbClr>
-                </a:solidFill>
-                <a:effectLst/>
-                <a:uLnTx/>
-                <a:uFillTx/>
-                <a:latin typeface="Calibri" panose="020F0502020204030204"/>
-                <a:ea typeface="+mn-ea"/>
-                <a:cs typeface="+mn-cs"/>
-              </a:endParaRPr>
-            </a:p>
-          </p:txBody>
-        </p:sp>
-        <p:sp>
-          <p:nvSpPr>
-            <p:cNvPr id="12" name="CaixaDeTexto 2">
-              <a:extLst>
-                <a:ext uri="{FF2B5EF4-FFF2-40B4-BE49-F238E27FC236}">
-                  <a16:creationId xmlns:a16="http://schemas.microsoft.com/office/drawing/2014/main" id="{7FA6F626-FF91-1F46-E80D-3A3BA0F57B54}"/>
-                </a:ext>
-              </a:extLst>
-            </p:cNvPr>
-            <p:cNvSpPr txBox="1"/>
-            <p:nvPr/>
-          </p:nvSpPr>
-          <p:spPr>
-            <a:xfrm>
-              <a:off x="678267" y="1285079"/>
-              <a:ext cx="2716575" cy="499571"/>
-            </a:xfrm>
-            <a:prstGeom prst="rect">
-              <a:avLst/>
-            </a:prstGeom>
-            <a:noFill/>
-          </p:spPr>
-          <p:txBody>
-            <a:bodyPr wrap="square" rtlCol="0">
-              <a:spAutoFit/>
-            </a:bodyPr>
-            <a:lstStyle/>
-            <a:p>
-              <a:pPr marL="0" marR="0" lvl="0" indent="0" algn="ctr" defTabSz="914400" rtl="0" eaLnBrk="1" fontAlgn="auto" latinLnBrk="0" hangingPunct="1">
-                <a:lnSpc>
-                  <a:spcPct val="100000"/>
-                </a:lnSpc>
-                <a:spcBef>
-                  <a:spcPts val="0"/>
-                </a:spcBef>
-                <a:spcAft>
-                  <a:spcPts val="0"/>
-                </a:spcAft>
-                <a:buClrTx/>
-                <a:buSzTx/>
-                <a:buFontTx/>
-                <a:buNone/>
-                <a:tabLst/>
-                <a:defRPr/>
-              </a:pPr>
-              <a:r>
-                <a:rPr kumimoji="0" lang="en-US" sz="2400" b="1" i="0" u="none" strike="noStrike" kern="1200" cap="none" spc="0" normalizeH="0" baseline="0" noProof="0" dirty="0">
-                  <a:ln>
-                    <a:noFill/>
-                  </a:ln>
-                  <a:solidFill>
-                    <a:prstClr val="black"/>
-                  </a:solidFill>
-                  <a:effectLst/>
-                  <a:uLnTx/>
-                  <a:uFillTx/>
-                  <a:latin typeface="Calibri" panose="020F0502020204030204"/>
-                  <a:ea typeface="+mn-ea"/>
-                  <a:cs typeface="+mn-cs"/>
-                </a:rPr>
-                <a:t>123456789</a:t>
-              </a:r>
-              <a:endParaRPr kumimoji="0" lang="pt-BR" sz="2400" b="1" i="0" u="none" strike="noStrike" kern="1200" cap="none" spc="0" normalizeH="0" baseline="0" noProof="0" dirty="0">
-                <a:ln>
-                  <a:noFill/>
-                </a:ln>
-                <a:solidFill>
-                  <a:prstClr val="black"/>
-                </a:solidFill>
-                <a:effectLst/>
-                <a:uLnTx/>
-                <a:uFillTx/>
-                <a:latin typeface="Calibri" panose="020F0502020204030204"/>
-                <a:ea typeface="+mn-ea"/>
-                <a:cs typeface="+mn-cs"/>
-              </a:endParaRPr>
-            </a:p>
-          </p:txBody>
-        </p:sp>
-        <p:sp>
-          <p:nvSpPr>
-            <p:cNvPr id="13" name="CaixaDeTexto 1">
-              <a:extLst>
-                <a:ext uri="{FF2B5EF4-FFF2-40B4-BE49-F238E27FC236}">
-                  <a16:creationId xmlns:a16="http://schemas.microsoft.com/office/drawing/2014/main" id="{A661121A-C719-1243-7324-567EB8C6F41C}"/>
-                </a:ext>
-              </a:extLst>
-            </p:cNvPr>
-            <p:cNvSpPr txBox="1"/>
-            <p:nvPr/>
-          </p:nvSpPr>
-          <p:spPr>
-            <a:xfrm>
-              <a:off x="825410" y="2104540"/>
-              <a:ext cx="2380243" cy="399657"/>
-            </a:xfrm>
-            <a:prstGeom prst="rect">
-              <a:avLst/>
-            </a:prstGeom>
-            <a:noFill/>
-          </p:spPr>
-          <p:txBody>
-            <a:bodyPr wrap="square" rtlCol="0">
-              <a:spAutoFit/>
-            </a:bodyPr>
-            <a:lstStyle/>
-            <a:p>
-              <a:pPr marL="0" marR="0" lvl="0" indent="0" algn="ctr" defTabSz="914400" rtl="0" eaLnBrk="1" fontAlgn="auto" latinLnBrk="0" hangingPunct="1">
-                <a:lnSpc>
-                  <a:spcPct val="100000"/>
-                </a:lnSpc>
-                <a:spcBef>
-                  <a:spcPts val="0"/>
-                </a:spcBef>
-                <a:spcAft>
-                  <a:spcPts val="0"/>
-                </a:spcAft>
-                <a:buClrTx/>
-                <a:buSzTx/>
-                <a:buFontTx/>
-                <a:buNone/>
-                <a:tabLst/>
-                <a:defRPr/>
-              </a:pPr>
-              <a:r>
-                <a:rPr kumimoji="0" lang="en-US" sz="1800" b="0" i="0" u="none" strike="noStrike" kern="1200" cap="none" spc="0" normalizeH="0" baseline="0" noProof="0" dirty="0">
-                  <a:ln>
-                    <a:noFill/>
-                  </a:ln>
-                  <a:solidFill>
-                    <a:prstClr val="black"/>
-                  </a:solidFill>
-                  <a:effectLst/>
-                  <a:uLnTx/>
-                  <a:uFillTx/>
-                  <a:latin typeface="Calibri" panose="020F0502020204030204"/>
-                  <a:ea typeface="+mn-ea"/>
-                  <a:cs typeface="+mn-cs"/>
-                </a:rPr>
-                <a:t>Min </a:t>
-              </a:r>
-              <a:r>
-                <a:rPr kumimoji="0" lang="en-US" sz="1800" b="0" i="0" u="none" strike="noStrike" kern="1200" cap="none" spc="0" normalizeH="0" baseline="0" noProof="0" dirty="0" err="1">
-                  <a:ln>
-                    <a:noFill/>
-                  </a:ln>
-                  <a:solidFill>
-                    <a:prstClr val="black"/>
-                  </a:solidFill>
-                  <a:effectLst/>
-                  <a:uLnTx/>
-                  <a:uFillTx/>
-                  <a:latin typeface="Calibri" panose="020F0502020204030204"/>
-                  <a:ea typeface="+mn-ea"/>
-                  <a:cs typeface="+mn-cs"/>
-                </a:rPr>
-                <a:t>Exames</a:t>
-              </a:r>
-              <a:r>
-                <a:rPr kumimoji="0" lang="en-US" sz="1800" b="0" i="0" u="none" strike="noStrike" kern="1200" cap="none" spc="0" normalizeH="0" baseline="0" noProof="0" dirty="0">
-                  <a:ln>
-                    <a:noFill/>
-                  </a:ln>
-                  <a:solidFill>
-                    <a:prstClr val="black"/>
-                  </a:solidFill>
-                  <a:effectLst/>
-                  <a:uLnTx/>
-                  <a:uFillTx/>
-                  <a:latin typeface="Calibri" panose="020F0502020204030204"/>
-                  <a:ea typeface="+mn-ea"/>
-                  <a:cs typeface="+mn-cs"/>
-                </a:rPr>
-                <a:t>/Status</a:t>
-              </a:r>
-              <a:endParaRPr kumimoji="0" lang="pt-BR" sz="1800" b="0" i="0" u="none" strike="noStrike" kern="1200" cap="none" spc="0" normalizeH="0" baseline="0" noProof="0" dirty="0">
-                <a:ln>
-                  <a:noFill/>
-                </a:ln>
-                <a:solidFill>
-                  <a:prstClr val="black"/>
-                </a:solidFill>
-                <a:effectLst/>
-                <a:uLnTx/>
-                <a:uFillTx/>
-                <a:latin typeface="Calibri" panose="020F0502020204030204"/>
-                <a:ea typeface="+mn-ea"/>
-                <a:cs typeface="+mn-cs"/>
-              </a:endParaRPr>
-            </a:p>
-          </p:txBody>
-        </p:sp>
-      </p:grpSp>
-      <p:grpSp>
-        <p:nvGrpSpPr>
-          <p:cNvPr id="14" name="Agrupar 13">
-            <a:extLst>
-              <a:ext uri="{FF2B5EF4-FFF2-40B4-BE49-F238E27FC236}">
-                <a16:creationId xmlns:a16="http://schemas.microsoft.com/office/drawing/2014/main" id="{B0B176A8-3FB5-1A44-A913-1A173D7F76CD}"/>
-              </a:ext>
-            </a:extLst>
-          </p:cNvPr>
-          <p:cNvGrpSpPr/>
-          <p:nvPr/>
-        </p:nvGrpSpPr>
-        <p:grpSpPr>
-          <a:xfrm>
-            <a:off x="8651500" y="1082129"/>
-            <a:ext cx="2555068" cy="1325176"/>
-            <a:chOff x="678267" y="1156137"/>
-            <a:chExt cx="2716575" cy="1433983"/>
-          </a:xfrm>
-        </p:grpSpPr>
-        <p:sp>
-          <p:nvSpPr>
-            <p:cNvPr id="15" name="Retângulo: Cantos Arredondados 14">
-              <a:extLst>
-                <a:ext uri="{FF2B5EF4-FFF2-40B4-BE49-F238E27FC236}">
-                  <a16:creationId xmlns:a16="http://schemas.microsoft.com/office/drawing/2014/main" id="{7FA65AFC-1AB6-3375-7680-A618C69F5676}"/>
-                </a:ext>
-              </a:extLst>
-            </p:cNvPr>
-            <p:cNvSpPr/>
-            <p:nvPr/>
-          </p:nvSpPr>
-          <p:spPr>
-            <a:xfrm>
-              <a:off x="678267" y="1156137"/>
-              <a:ext cx="2716575" cy="1433983"/>
-            </a:xfrm>
-            <a:prstGeom prst="roundRect">
-              <a:avLst/>
-            </a:prstGeom>
-            <a:solidFill>
-              <a:srgbClr val="EEEFEA"/>
-            </a:solidFill>
-            <a:ln>
-              <a:noFill/>
-            </a:ln>
-          </p:spPr>
-          <p:style>
-            <a:lnRef idx="2">
-              <a:schemeClr val="accent1">
-                <a:shade val="50000"/>
-              </a:schemeClr>
-            </a:lnRef>
-            <a:fillRef idx="1">
-              <a:schemeClr val="accent1"/>
-            </a:fillRef>
-            <a:effectRef idx="0">
-              <a:schemeClr val="accent1"/>
-            </a:effectRef>
-            <a:fontRef idx="minor">
-              <a:schemeClr val="lt1"/>
-            </a:fontRef>
-          </p:style>
-          <p:txBody>
-            <a:bodyPr rtlCol="0" anchor="ctr"/>
-            <a:lstStyle/>
-            <a:p>
-              <a:pPr marL="0" marR="0" lvl="0" indent="0" algn="ctr" defTabSz="914400" rtl="0" eaLnBrk="1" fontAlgn="auto" latinLnBrk="0" hangingPunct="1">
-                <a:lnSpc>
-                  <a:spcPct val="100000"/>
-                </a:lnSpc>
-                <a:spcBef>
-                  <a:spcPts val="0"/>
-                </a:spcBef>
-                <a:spcAft>
-                  <a:spcPts val="0"/>
-                </a:spcAft>
-                <a:buClrTx/>
-                <a:buSzTx/>
-                <a:buFontTx/>
-                <a:buNone/>
-                <a:tabLst/>
-                <a:defRPr/>
-              </a:pPr>
-              <a:endParaRPr kumimoji="0" lang="pt-BR" sz="1800" b="0" i="0" u="none" strike="noStrike" kern="1200" cap="none" spc="0" normalizeH="0" baseline="0" noProof="0">
-                <a:ln>
-                  <a:noFill/>
-                </a:ln>
-                <a:solidFill>
-                  <a:srgbClr val="A5A5A5">
-                    <a:lumMod val="20000"/>
-                    <a:lumOff val="80000"/>
-                  </a:srgbClr>
-                </a:solidFill>
-                <a:effectLst/>
-                <a:uLnTx/>
-                <a:uFillTx/>
-                <a:latin typeface="Calibri" panose="020F0502020204030204"/>
-                <a:ea typeface="+mn-ea"/>
-                <a:cs typeface="+mn-cs"/>
-              </a:endParaRPr>
-            </a:p>
-          </p:txBody>
-        </p:sp>
-        <p:sp>
-          <p:nvSpPr>
-            <p:cNvPr id="16" name="CaixaDeTexto 2">
-              <a:extLst>
-                <a:ext uri="{FF2B5EF4-FFF2-40B4-BE49-F238E27FC236}">
-                  <a16:creationId xmlns:a16="http://schemas.microsoft.com/office/drawing/2014/main" id="{02710B9A-460D-D790-BBCE-5C88EEEB9178}"/>
-                </a:ext>
-              </a:extLst>
-            </p:cNvPr>
-            <p:cNvSpPr txBox="1"/>
-            <p:nvPr/>
-          </p:nvSpPr>
-          <p:spPr>
-            <a:xfrm>
-              <a:off x="678267" y="1285079"/>
-              <a:ext cx="2716575" cy="499571"/>
-            </a:xfrm>
-            <a:prstGeom prst="rect">
-              <a:avLst/>
-            </a:prstGeom>
-            <a:noFill/>
-          </p:spPr>
-          <p:txBody>
-            <a:bodyPr wrap="square" rtlCol="0">
-              <a:spAutoFit/>
-            </a:bodyPr>
-            <a:lstStyle/>
-            <a:p>
-              <a:pPr marL="0" marR="0" lvl="0" indent="0" algn="ctr" defTabSz="914400" rtl="0" eaLnBrk="1" fontAlgn="auto" latinLnBrk="0" hangingPunct="1">
-                <a:lnSpc>
-                  <a:spcPct val="100000"/>
-                </a:lnSpc>
-                <a:spcBef>
-                  <a:spcPts val="0"/>
-                </a:spcBef>
-                <a:spcAft>
-                  <a:spcPts val="0"/>
-                </a:spcAft>
-                <a:buClrTx/>
-                <a:buSzTx/>
-                <a:buFontTx/>
-                <a:buNone/>
-                <a:tabLst/>
-                <a:defRPr/>
-              </a:pPr>
-              <a:r>
-                <a:rPr kumimoji="0" lang="en-US" sz="2400" b="1" i="0" u="none" strike="noStrike" kern="1200" cap="none" spc="0" normalizeH="0" baseline="0" noProof="0" dirty="0">
-                  <a:ln>
-                    <a:noFill/>
-                  </a:ln>
-                  <a:solidFill>
-                    <a:prstClr val="black"/>
-                  </a:solidFill>
-                  <a:effectLst/>
-                  <a:uLnTx/>
-                  <a:uFillTx/>
-                  <a:latin typeface="Calibri" panose="020F0502020204030204"/>
-                  <a:ea typeface="+mn-ea"/>
-                  <a:cs typeface="+mn-cs"/>
-                </a:rPr>
-                <a:t>123456789</a:t>
-              </a:r>
-              <a:endParaRPr kumimoji="0" lang="pt-BR" sz="2400" b="1" i="0" u="none" strike="noStrike" kern="1200" cap="none" spc="0" normalizeH="0" baseline="0" noProof="0" dirty="0">
-                <a:ln>
-                  <a:noFill/>
-                </a:ln>
-                <a:solidFill>
-                  <a:prstClr val="black"/>
-                </a:solidFill>
-                <a:effectLst/>
-                <a:uLnTx/>
-                <a:uFillTx/>
-                <a:latin typeface="Calibri" panose="020F0502020204030204"/>
-                <a:ea typeface="+mn-ea"/>
-                <a:cs typeface="+mn-cs"/>
-              </a:endParaRPr>
-            </a:p>
-          </p:txBody>
-        </p:sp>
-        <p:sp>
-          <p:nvSpPr>
-            <p:cNvPr id="17" name="CaixaDeTexto 1">
-              <a:extLst>
-                <a:ext uri="{FF2B5EF4-FFF2-40B4-BE49-F238E27FC236}">
-                  <a16:creationId xmlns:a16="http://schemas.microsoft.com/office/drawing/2014/main" id="{6B45D934-1F73-3F05-85D0-7FF95F165CDD}"/>
-                </a:ext>
-              </a:extLst>
-            </p:cNvPr>
-            <p:cNvSpPr txBox="1"/>
-            <p:nvPr/>
-          </p:nvSpPr>
-          <p:spPr>
-            <a:xfrm>
-              <a:off x="825410" y="2104540"/>
-              <a:ext cx="2380243" cy="399657"/>
-            </a:xfrm>
-            <a:prstGeom prst="rect">
-              <a:avLst/>
-            </a:prstGeom>
-            <a:noFill/>
-          </p:spPr>
-          <p:txBody>
-            <a:bodyPr wrap="square" rtlCol="0">
-              <a:spAutoFit/>
-            </a:bodyPr>
-            <a:lstStyle/>
-            <a:p>
-              <a:pPr marL="0" marR="0" lvl="0" indent="0" algn="ctr" defTabSz="914400" rtl="0" eaLnBrk="1" fontAlgn="auto" latinLnBrk="0" hangingPunct="1">
-                <a:lnSpc>
-                  <a:spcPct val="100000"/>
-                </a:lnSpc>
-                <a:spcBef>
-                  <a:spcPts val="0"/>
-                </a:spcBef>
-                <a:spcAft>
-                  <a:spcPts val="0"/>
-                </a:spcAft>
-                <a:buClrTx/>
-                <a:buSzTx/>
-                <a:buFontTx/>
-                <a:buNone/>
-                <a:tabLst/>
-                <a:defRPr/>
-              </a:pPr>
-              <a:r>
-                <a:rPr kumimoji="0" lang="en-US" sz="1800" b="0" i="0" u="none" strike="noStrike" kern="1200" cap="none" spc="0" normalizeH="0" baseline="0" noProof="0" dirty="0" err="1">
-                  <a:ln>
-                    <a:noFill/>
-                  </a:ln>
-                  <a:solidFill>
-                    <a:prstClr val="black"/>
-                  </a:solidFill>
-                  <a:effectLst/>
-                  <a:uLnTx/>
-                  <a:uFillTx/>
-                  <a:latin typeface="Calibri" panose="020F0502020204030204"/>
-                  <a:ea typeface="+mn-ea"/>
-                  <a:cs typeface="+mn-cs"/>
-                </a:rPr>
-                <a:t>Máx</a:t>
-              </a:r>
-              <a:r>
-                <a:rPr kumimoji="0" lang="en-US" sz="1800" b="0" i="0" u="none" strike="noStrike" kern="1200" cap="none" spc="0" normalizeH="0" baseline="0" noProof="0" dirty="0">
-                  <a:ln>
-                    <a:noFill/>
-                  </a:ln>
-                  <a:solidFill>
-                    <a:prstClr val="black"/>
-                  </a:solidFill>
-                  <a:effectLst/>
-                  <a:uLnTx/>
-                  <a:uFillTx/>
-                  <a:latin typeface="Calibri" panose="020F0502020204030204"/>
-                  <a:ea typeface="+mn-ea"/>
-                  <a:cs typeface="+mn-cs"/>
-                </a:rPr>
-                <a:t> </a:t>
-              </a:r>
-              <a:r>
-                <a:rPr kumimoji="0" lang="en-US" sz="1800" b="0" i="0" u="none" strike="noStrike" kern="1200" cap="none" spc="0" normalizeH="0" baseline="0" noProof="0" dirty="0" err="1">
-                  <a:ln>
-                    <a:noFill/>
-                  </a:ln>
-                  <a:solidFill>
-                    <a:prstClr val="black"/>
-                  </a:solidFill>
-                  <a:effectLst/>
-                  <a:uLnTx/>
-                  <a:uFillTx/>
-                  <a:latin typeface="Calibri" panose="020F0502020204030204"/>
-                  <a:ea typeface="+mn-ea"/>
-                  <a:cs typeface="+mn-cs"/>
-                </a:rPr>
-                <a:t>Exames</a:t>
-              </a:r>
-              <a:r>
-                <a:rPr kumimoji="0" lang="en-US" sz="1800" b="0" i="0" u="none" strike="noStrike" kern="1200" cap="none" spc="0" normalizeH="0" baseline="0" noProof="0" dirty="0">
-                  <a:ln>
-                    <a:noFill/>
-                  </a:ln>
-                  <a:solidFill>
-                    <a:prstClr val="black"/>
-                  </a:solidFill>
-                  <a:effectLst/>
-                  <a:uLnTx/>
-                  <a:uFillTx/>
-                  <a:latin typeface="Calibri" panose="020F0502020204030204"/>
-                  <a:ea typeface="+mn-ea"/>
-                  <a:cs typeface="+mn-cs"/>
-                </a:rPr>
-                <a:t>/Status</a:t>
-              </a:r>
-              <a:endParaRPr kumimoji="0" lang="pt-BR" sz="1800" b="0" i="0" u="none" strike="noStrike" kern="1200" cap="none" spc="0" normalizeH="0" baseline="0" noProof="0" dirty="0">
-                <a:ln>
-                  <a:noFill/>
-                </a:ln>
-                <a:solidFill>
-                  <a:prstClr val="black"/>
-                </a:solidFill>
-                <a:effectLst/>
-                <a:uLnTx/>
-                <a:uFillTx/>
-                <a:latin typeface="Calibri" panose="020F0502020204030204"/>
-                <a:ea typeface="+mn-ea"/>
-                <a:cs typeface="+mn-cs"/>
-              </a:endParaRPr>
-            </a:p>
-          </p:txBody>
-        </p:sp>
-      </p:grpSp>
       <p:graphicFrame>
         <p:nvGraphicFramePr>
           <p:cNvPr id="4" name="Gráfico 3">

</xml_diff>

<commit_message>
Finalizando alterações no Relatório em pptx
</commit_message>
<xml_diff>
--- a/src/main/conv_exames/ppt/base_conv_exames_v2.pptx
+++ b/src/main/conv_exames/ppt/base_conv_exames_v2.pptx
@@ -1087,6 +1087,90 @@
             </c:extLst>
           </c:dPt>
           <c:dLbls>
+            <c:dLbl>
+              <c:idx val="0"/>
+              <c:layout>
+                <c:manualLayout>
+                  <c:x val="7.9852080532933967E-2"/>
+                  <c:y val="-0.14763857668132752"/>
+                </c:manualLayout>
+              </c:layout>
+              <c:showLegendKey val="0"/>
+              <c:showVal val="0"/>
+              <c:showCatName val="0"/>
+              <c:showSerName val="0"/>
+              <c:showPercent val="1"/>
+              <c:showBubbleSize val="0"/>
+              <c:extLst>
+                <c:ext xmlns:c15="http://schemas.microsoft.com/office/drawing/2012/chart" uri="{CE6537A1-D6FC-4f65-9D91-7224C49458BB}"/>
+                <c:ext xmlns:c16="http://schemas.microsoft.com/office/drawing/2014/chart" uri="{C3380CC4-5D6E-409C-BE32-E72D297353CC}">
+                  <c16:uniqueId val="{00000001-6811-43F0-82E1-1E815561270D}"/>
+                </c:ext>
+              </c:extLst>
+            </c:dLbl>
+            <c:dLbl>
+              <c:idx val="1"/>
+              <c:layout>
+                <c:manualLayout>
+                  <c:x val="8.1753320545622954E-2"/>
+                  <c:y val="0.14763857668132752"/>
+                </c:manualLayout>
+              </c:layout>
+              <c:showLegendKey val="0"/>
+              <c:showVal val="0"/>
+              <c:showCatName val="0"/>
+              <c:showSerName val="0"/>
+              <c:showPercent val="1"/>
+              <c:showBubbleSize val="0"/>
+              <c:extLst>
+                <c:ext xmlns:c15="http://schemas.microsoft.com/office/drawing/2012/chart" uri="{CE6537A1-D6FC-4f65-9D91-7224C49458BB}"/>
+                <c:ext xmlns:c16="http://schemas.microsoft.com/office/drawing/2014/chart" uri="{C3380CC4-5D6E-409C-BE32-E72D297353CC}">
+                  <c16:uniqueId val="{00000003-6811-43F0-82E1-1E815561270D}"/>
+                </c:ext>
+              </c:extLst>
+            </c:dLbl>
+            <c:dLbl>
+              <c:idx val="2"/>
+              <c:layout>
+                <c:manualLayout>
+                  <c:x val="-0.11787688078671216"/>
+                  <c:y val="0.10082634505066268"/>
+                </c:manualLayout>
+              </c:layout>
+              <c:showLegendKey val="0"/>
+              <c:showVal val="0"/>
+              <c:showCatName val="0"/>
+              <c:showSerName val="0"/>
+              <c:showPercent val="1"/>
+              <c:showBubbleSize val="0"/>
+              <c:extLst>
+                <c:ext xmlns:c15="http://schemas.microsoft.com/office/drawing/2012/chart" uri="{CE6537A1-D6FC-4f65-9D91-7224C49458BB}"/>
+                <c:ext xmlns:c16="http://schemas.microsoft.com/office/drawing/2014/chart" uri="{C3380CC4-5D6E-409C-BE32-E72D297353CC}">
+                  <c16:uniqueId val="{00000005-6811-43F0-82E1-1E815561270D}"/>
+                </c:ext>
+              </c:extLst>
+            </c:dLbl>
+            <c:dLbl>
+              <c:idx val="3"/>
+              <c:layout>
+                <c:manualLayout>
+                  <c:x val="-8.3654560558311858E-2"/>
+                  <c:y val="-0.15484045847066058"/>
+                </c:manualLayout>
+              </c:layout>
+              <c:showLegendKey val="0"/>
+              <c:showVal val="0"/>
+              <c:showCatName val="0"/>
+              <c:showSerName val="0"/>
+              <c:showPercent val="1"/>
+              <c:showBubbleSize val="0"/>
+              <c:extLst>
+                <c:ext xmlns:c15="http://schemas.microsoft.com/office/drawing/2012/chart" uri="{CE6537A1-D6FC-4f65-9D91-7224C49458BB}"/>
+                <c:ext xmlns:c16="http://schemas.microsoft.com/office/drawing/2014/chart" uri="{C3380CC4-5D6E-409C-BE32-E72D297353CC}">
+                  <c16:uniqueId val="{00000007-6811-43F0-82E1-1E815561270D}"/>
+                </c:ext>
+              </c:extLst>
+            </c:dLbl>
             <c:spPr>
               <a:noFill/>
               <a:ln>
@@ -5600,1627 +5684,6 @@
           </p:txBody>
         </p:sp>
       </p:grpSp>
-      <p:grpSp>
-        <p:nvGrpSpPr>
-          <p:cNvPr id="55" name="Agrupar 54">
-            <a:extLst>
-              <a:ext uri="{FF2B5EF4-FFF2-40B4-BE49-F238E27FC236}">
-                <a16:creationId xmlns:a16="http://schemas.microsoft.com/office/drawing/2014/main" id="{FBCE21D1-CA3B-E38C-FCD8-444FAD3C1B44}"/>
-              </a:ext>
-            </a:extLst>
-          </p:cNvPr>
-          <p:cNvGrpSpPr/>
-          <p:nvPr/>
-        </p:nvGrpSpPr>
-        <p:grpSpPr>
-          <a:xfrm>
-            <a:off x="723352" y="2953035"/>
-            <a:ext cx="2555068" cy="1325176"/>
-            <a:chOff x="678267" y="1156137"/>
-            <a:chExt cx="2716575" cy="1433983"/>
-          </a:xfrm>
-        </p:grpSpPr>
-        <p:sp>
-          <p:nvSpPr>
-            <p:cNvPr id="56" name="Retângulo: Cantos Arredondados 55">
-              <a:extLst>
-                <a:ext uri="{FF2B5EF4-FFF2-40B4-BE49-F238E27FC236}">
-                  <a16:creationId xmlns:a16="http://schemas.microsoft.com/office/drawing/2014/main" id="{0EA8C8E7-77A4-DCF8-0D65-6718EE124049}"/>
-                </a:ext>
-              </a:extLst>
-            </p:cNvPr>
-            <p:cNvSpPr/>
-            <p:nvPr/>
-          </p:nvSpPr>
-          <p:spPr>
-            <a:xfrm>
-              <a:off x="678267" y="1156137"/>
-              <a:ext cx="2716575" cy="1433983"/>
-            </a:xfrm>
-            <a:prstGeom prst="roundRect">
-              <a:avLst/>
-            </a:prstGeom>
-            <a:solidFill>
-              <a:srgbClr val="EEEFEA"/>
-            </a:solidFill>
-            <a:ln>
-              <a:noFill/>
-            </a:ln>
-          </p:spPr>
-          <p:style>
-            <a:lnRef idx="2">
-              <a:schemeClr val="accent1">
-                <a:shade val="50000"/>
-              </a:schemeClr>
-            </a:lnRef>
-            <a:fillRef idx="1">
-              <a:schemeClr val="accent1"/>
-            </a:fillRef>
-            <a:effectRef idx="0">
-              <a:schemeClr val="accent1"/>
-            </a:effectRef>
-            <a:fontRef idx="minor">
-              <a:schemeClr val="lt1"/>
-            </a:fontRef>
-          </p:style>
-          <p:txBody>
-            <a:bodyPr rtlCol="0" anchor="ctr"/>
-            <a:lstStyle/>
-            <a:p>
-              <a:pPr marL="0" marR="0" lvl="0" indent="0" algn="ctr" defTabSz="914400" rtl="0" eaLnBrk="1" fontAlgn="auto" latinLnBrk="0" hangingPunct="1">
-                <a:lnSpc>
-                  <a:spcPct val="100000"/>
-                </a:lnSpc>
-                <a:spcBef>
-                  <a:spcPts val="0"/>
-                </a:spcBef>
-                <a:spcAft>
-                  <a:spcPts val="0"/>
-                </a:spcAft>
-                <a:buClrTx/>
-                <a:buSzTx/>
-                <a:buFontTx/>
-                <a:buNone/>
-                <a:tabLst/>
-                <a:defRPr/>
-              </a:pPr>
-              <a:endParaRPr kumimoji="0" lang="pt-BR" sz="1800" b="0" i="0" u="none" strike="noStrike" kern="1200" cap="none" spc="0" normalizeH="0" baseline="0" noProof="0">
-                <a:ln>
-                  <a:noFill/>
-                </a:ln>
-                <a:solidFill>
-                  <a:srgbClr val="A5A5A5">
-                    <a:lumMod val="20000"/>
-                    <a:lumOff val="80000"/>
-                  </a:srgbClr>
-                </a:solidFill>
-                <a:effectLst/>
-                <a:uLnTx/>
-                <a:uFillTx/>
-                <a:latin typeface="Calibri" panose="020F0502020204030204"/>
-                <a:ea typeface="+mn-ea"/>
-                <a:cs typeface="+mn-cs"/>
-              </a:endParaRPr>
-            </a:p>
-          </p:txBody>
-        </p:sp>
-        <p:sp>
-          <p:nvSpPr>
-            <p:cNvPr id="57" name="CaixaDeTexto 2">
-              <a:extLst>
-                <a:ext uri="{FF2B5EF4-FFF2-40B4-BE49-F238E27FC236}">
-                  <a16:creationId xmlns:a16="http://schemas.microsoft.com/office/drawing/2014/main" id="{04357019-614A-4E62-7A0F-ACBF99960155}"/>
-                </a:ext>
-              </a:extLst>
-            </p:cNvPr>
-            <p:cNvSpPr txBox="1"/>
-            <p:nvPr/>
-          </p:nvSpPr>
-          <p:spPr>
-            <a:xfrm>
-              <a:off x="678267" y="1285079"/>
-              <a:ext cx="2716575" cy="499571"/>
-            </a:xfrm>
-            <a:prstGeom prst="rect">
-              <a:avLst/>
-            </a:prstGeom>
-            <a:noFill/>
-          </p:spPr>
-          <p:txBody>
-            <a:bodyPr wrap="square" rtlCol="0">
-              <a:spAutoFit/>
-            </a:bodyPr>
-            <a:lstStyle/>
-            <a:p>
-              <a:pPr marL="0" marR="0" lvl="0" indent="0" algn="ctr" defTabSz="914400" rtl="0" eaLnBrk="1" fontAlgn="auto" latinLnBrk="0" hangingPunct="1">
-                <a:lnSpc>
-                  <a:spcPct val="100000"/>
-                </a:lnSpc>
-                <a:spcBef>
-                  <a:spcPts val="0"/>
-                </a:spcBef>
-                <a:spcAft>
-                  <a:spcPts val="0"/>
-                </a:spcAft>
-                <a:buClrTx/>
-                <a:buSzTx/>
-                <a:buFontTx/>
-                <a:buNone/>
-                <a:tabLst/>
-                <a:defRPr/>
-              </a:pPr>
-              <a:r>
-                <a:rPr kumimoji="0" lang="en-US" sz="2400" b="1" i="0" u="none" strike="noStrike" kern="1200" cap="none" spc="0" normalizeH="0" baseline="0" noProof="0" dirty="0">
-                  <a:ln>
-                    <a:noFill/>
-                  </a:ln>
-                  <a:solidFill>
-                    <a:prstClr val="black"/>
-                  </a:solidFill>
-                  <a:effectLst/>
-                  <a:uLnTx/>
-                  <a:uFillTx/>
-                  <a:latin typeface="Calibri" panose="020F0502020204030204"/>
-                  <a:ea typeface="+mn-ea"/>
-                  <a:cs typeface="+mn-cs"/>
-                </a:rPr>
-                <a:t>123456789</a:t>
-              </a:r>
-              <a:endParaRPr kumimoji="0" lang="pt-BR" sz="2400" b="1" i="0" u="none" strike="noStrike" kern="1200" cap="none" spc="0" normalizeH="0" baseline="0" noProof="0" dirty="0">
-                <a:ln>
-                  <a:noFill/>
-                </a:ln>
-                <a:solidFill>
-                  <a:prstClr val="black"/>
-                </a:solidFill>
-                <a:effectLst/>
-                <a:uLnTx/>
-                <a:uFillTx/>
-                <a:latin typeface="Calibri" panose="020F0502020204030204"/>
-                <a:ea typeface="+mn-ea"/>
-                <a:cs typeface="+mn-cs"/>
-              </a:endParaRPr>
-            </a:p>
-          </p:txBody>
-        </p:sp>
-        <p:sp>
-          <p:nvSpPr>
-            <p:cNvPr id="58" name="CaixaDeTexto 1">
-              <a:extLst>
-                <a:ext uri="{FF2B5EF4-FFF2-40B4-BE49-F238E27FC236}">
-                  <a16:creationId xmlns:a16="http://schemas.microsoft.com/office/drawing/2014/main" id="{49E2A1BB-3F2E-B097-1285-14532B129021}"/>
-                </a:ext>
-              </a:extLst>
-            </p:cNvPr>
-            <p:cNvSpPr txBox="1"/>
-            <p:nvPr/>
-          </p:nvSpPr>
-          <p:spPr>
-            <a:xfrm>
-              <a:off x="825410" y="2104539"/>
-              <a:ext cx="2380243" cy="333048"/>
-            </a:xfrm>
-            <a:prstGeom prst="rect">
-              <a:avLst/>
-            </a:prstGeom>
-            <a:noFill/>
-          </p:spPr>
-          <p:txBody>
-            <a:bodyPr wrap="square" rtlCol="0">
-              <a:spAutoFit/>
-            </a:bodyPr>
-            <a:lstStyle/>
-            <a:p>
-              <a:pPr marL="0" marR="0" lvl="0" indent="0" algn="ctr" defTabSz="914400" rtl="0" eaLnBrk="1" fontAlgn="auto" latinLnBrk="0" hangingPunct="1">
-                <a:lnSpc>
-                  <a:spcPct val="100000"/>
-                </a:lnSpc>
-                <a:spcBef>
-                  <a:spcPts val="0"/>
-                </a:spcBef>
-                <a:spcAft>
-                  <a:spcPts val="0"/>
-                </a:spcAft>
-                <a:buClrTx/>
-                <a:buSzTx/>
-                <a:buFontTx/>
-                <a:buNone/>
-                <a:tabLst/>
-                <a:defRPr/>
-              </a:pPr>
-              <a:r>
-                <a:rPr kumimoji="0" lang="en-US" sz="1400" b="0" i="0" u="none" strike="noStrike" kern="1200" cap="none" spc="0" normalizeH="0" baseline="0" noProof="0" dirty="0" err="1">
-                  <a:ln>
-                    <a:noFill/>
-                  </a:ln>
-                  <a:solidFill>
-                    <a:prstClr val="black"/>
-                  </a:solidFill>
-                  <a:effectLst/>
-                  <a:uLnTx/>
-                  <a:uFillTx/>
-                  <a:latin typeface="Calibri" panose="020F0502020204030204"/>
-                  <a:ea typeface="+mn-ea"/>
-                  <a:cs typeface="+mn-cs"/>
-                </a:rPr>
-                <a:t>Máx</a:t>
-              </a:r>
-              <a:r>
-                <a:rPr kumimoji="0" lang="en-US" sz="1400" b="0" i="0" u="none" strike="noStrike" kern="1200" cap="none" spc="0" normalizeH="0" baseline="0" noProof="0" dirty="0">
-                  <a:ln>
-                    <a:noFill/>
-                  </a:ln>
-                  <a:solidFill>
-                    <a:prstClr val="black"/>
-                  </a:solidFill>
-                  <a:effectLst/>
-                  <a:uLnTx/>
-                  <a:uFillTx/>
-                  <a:latin typeface="Calibri" panose="020F0502020204030204"/>
-                  <a:ea typeface="+mn-ea"/>
-                  <a:cs typeface="+mn-cs"/>
-                </a:rPr>
-                <a:t> </a:t>
-              </a:r>
-              <a:r>
-                <a:rPr kumimoji="0" lang="en-US" sz="1400" b="0" i="0" u="none" strike="noStrike" kern="1200" cap="none" spc="0" normalizeH="0" baseline="0" noProof="0" dirty="0" err="1">
-                  <a:ln>
-                    <a:noFill/>
-                  </a:ln>
-                  <a:solidFill>
-                    <a:prstClr val="black"/>
-                  </a:solidFill>
-                  <a:effectLst/>
-                  <a:uLnTx/>
-                  <a:uFillTx/>
-                  <a:latin typeface="Calibri" panose="020F0502020204030204"/>
-                  <a:ea typeface="+mn-ea"/>
-                  <a:cs typeface="+mn-cs"/>
-                </a:rPr>
-                <a:t>Exames</a:t>
-              </a:r>
-              <a:r>
-                <a:rPr kumimoji="0" lang="en-US" sz="1400" b="0" i="0" u="none" strike="noStrike" kern="1200" cap="none" spc="0" normalizeH="0" baseline="0" noProof="0" dirty="0">
-                  <a:ln>
-                    <a:noFill/>
-                  </a:ln>
-                  <a:solidFill>
-                    <a:prstClr val="black"/>
-                  </a:solidFill>
-                  <a:effectLst/>
-                  <a:uLnTx/>
-                  <a:uFillTx/>
-                  <a:latin typeface="Calibri" panose="020F0502020204030204"/>
-                  <a:ea typeface="+mn-ea"/>
-                  <a:cs typeface="+mn-cs"/>
-                </a:rPr>
-                <a:t>/</a:t>
-              </a:r>
-              <a:r>
-                <a:rPr kumimoji="0" lang="en-US" sz="1400" b="0" i="0" u="none" strike="noStrike" kern="1200" cap="none" spc="0" normalizeH="0" baseline="0" noProof="0" dirty="0" err="1">
-                  <a:ln>
-                    <a:noFill/>
-                  </a:ln>
-                  <a:solidFill>
-                    <a:prstClr val="black"/>
-                  </a:solidFill>
-                  <a:effectLst/>
-                  <a:uLnTx/>
-                  <a:uFillTx/>
-                  <a:latin typeface="Calibri" panose="020F0502020204030204"/>
-                  <a:ea typeface="+mn-ea"/>
-                  <a:cs typeface="+mn-cs"/>
-                </a:rPr>
-                <a:t>Funcionário</a:t>
-              </a:r>
-              <a:endParaRPr kumimoji="0" lang="pt-BR" sz="1400" b="0" i="0" u="none" strike="noStrike" kern="1200" cap="none" spc="0" normalizeH="0" baseline="0" noProof="0" dirty="0">
-                <a:ln>
-                  <a:noFill/>
-                </a:ln>
-                <a:solidFill>
-                  <a:prstClr val="black"/>
-                </a:solidFill>
-                <a:effectLst/>
-                <a:uLnTx/>
-                <a:uFillTx/>
-                <a:latin typeface="Calibri" panose="020F0502020204030204"/>
-                <a:ea typeface="+mn-ea"/>
-                <a:cs typeface="+mn-cs"/>
-              </a:endParaRPr>
-            </a:p>
-          </p:txBody>
-        </p:sp>
-      </p:grpSp>
-      <p:grpSp>
-        <p:nvGrpSpPr>
-          <p:cNvPr id="59" name="Agrupar 58">
-            <a:extLst>
-              <a:ext uri="{FF2B5EF4-FFF2-40B4-BE49-F238E27FC236}">
-                <a16:creationId xmlns:a16="http://schemas.microsoft.com/office/drawing/2014/main" id="{74AD9E6B-9E28-DCD9-F798-F27D14E4491A}"/>
-              </a:ext>
-            </a:extLst>
-          </p:cNvPr>
-          <p:cNvGrpSpPr/>
-          <p:nvPr/>
-        </p:nvGrpSpPr>
-        <p:grpSpPr>
-          <a:xfrm>
-            <a:off x="4818466" y="2953035"/>
-            <a:ext cx="2555068" cy="1325176"/>
-            <a:chOff x="678267" y="1156137"/>
-            <a:chExt cx="2716575" cy="1433983"/>
-          </a:xfrm>
-        </p:grpSpPr>
-        <p:sp>
-          <p:nvSpPr>
-            <p:cNvPr id="60" name="Retângulo: Cantos Arredondados 59">
-              <a:extLst>
-                <a:ext uri="{FF2B5EF4-FFF2-40B4-BE49-F238E27FC236}">
-                  <a16:creationId xmlns:a16="http://schemas.microsoft.com/office/drawing/2014/main" id="{BB2E24E8-9BFC-2D03-CB6C-F6F341DA9EF3}"/>
-                </a:ext>
-              </a:extLst>
-            </p:cNvPr>
-            <p:cNvSpPr/>
-            <p:nvPr/>
-          </p:nvSpPr>
-          <p:spPr>
-            <a:xfrm>
-              <a:off x="678267" y="1156137"/>
-              <a:ext cx="2716575" cy="1433983"/>
-            </a:xfrm>
-            <a:prstGeom prst="roundRect">
-              <a:avLst/>
-            </a:prstGeom>
-            <a:solidFill>
-              <a:srgbClr val="EEEFEA"/>
-            </a:solidFill>
-            <a:ln>
-              <a:noFill/>
-            </a:ln>
-          </p:spPr>
-          <p:style>
-            <a:lnRef idx="2">
-              <a:schemeClr val="accent1">
-                <a:shade val="50000"/>
-              </a:schemeClr>
-            </a:lnRef>
-            <a:fillRef idx="1">
-              <a:schemeClr val="accent1"/>
-            </a:fillRef>
-            <a:effectRef idx="0">
-              <a:schemeClr val="accent1"/>
-            </a:effectRef>
-            <a:fontRef idx="minor">
-              <a:schemeClr val="lt1"/>
-            </a:fontRef>
-          </p:style>
-          <p:txBody>
-            <a:bodyPr rtlCol="0" anchor="ctr"/>
-            <a:lstStyle/>
-            <a:p>
-              <a:pPr marL="0" marR="0" lvl="0" indent="0" algn="ctr" defTabSz="914400" rtl="0" eaLnBrk="1" fontAlgn="auto" latinLnBrk="0" hangingPunct="1">
-                <a:lnSpc>
-                  <a:spcPct val="100000"/>
-                </a:lnSpc>
-                <a:spcBef>
-                  <a:spcPts val="0"/>
-                </a:spcBef>
-                <a:spcAft>
-                  <a:spcPts val="0"/>
-                </a:spcAft>
-                <a:buClrTx/>
-                <a:buSzTx/>
-                <a:buFontTx/>
-                <a:buNone/>
-                <a:tabLst/>
-                <a:defRPr/>
-              </a:pPr>
-              <a:endParaRPr kumimoji="0" lang="pt-BR" sz="1800" b="0" i="0" u="none" strike="noStrike" kern="1200" cap="none" spc="0" normalizeH="0" baseline="0" noProof="0">
-                <a:ln>
-                  <a:noFill/>
-                </a:ln>
-                <a:solidFill>
-                  <a:srgbClr val="A5A5A5">
-                    <a:lumMod val="20000"/>
-                    <a:lumOff val="80000"/>
-                  </a:srgbClr>
-                </a:solidFill>
-                <a:effectLst/>
-                <a:uLnTx/>
-                <a:uFillTx/>
-                <a:latin typeface="Calibri" panose="020F0502020204030204"/>
-                <a:ea typeface="+mn-ea"/>
-                <a:cs typeface="+mn-cs"/>
-              </a:endParaRPr>
-            </a:p>
-          </p:txBody>
-        </p:sp>
-        <p:sp>
-          <p:nvSpPr>
-            <p:cNvPr id="61" name="CaixaDeTexto 2">
-              <a:extLst>
-                <a:ext uri="{FF2B5EF4-FFF2-40B4-BE49-F238E27FC236}">
-                  <a16:creationId xmlns:a16="http://schemas.microsoft.com/office/drawing/2014/main" id="{45E9B181-7F4C-05E7-7FC7-A99E2A6D2CF0}"/>
-                </a:ext>
-              </a:extLst>
-            </p:cNvPr>
-            <p:cNvSpPr txBox="1"/>
-            <p:nvPr/>
-          </p:nvSpPr>
-          <p:spPr>
-            <a:xfrm>
-              <a:off x="678267" y="1285079"/>
-              <a:ext cx="2716575" cy="499571"/>
-            </a:xfrm>
-            <a:prstGeom prst="rect">
-              <a:avLst/>
-            </a:prstGeom>
-            <a:noFill/>
-          </p:spPr>
-          <p:txBody>
-            <a:bodyPr wrap="square" rtlCol="0">
-              <a:spAutoFit/>
-            </a:bodyPr>
-            <a:lstStyle/>
-            <a:p>
-              <a:pPr marL="0" marR="0" lvl="0" indent="0" algn="ctr" defTabSz="914400" rtl="0" eaLnBrk="1" fontAlgn="auto" latinLnBrk="0" hangingPunct="1">
-                <a:lnSpc>
-                  <a:spcPct val="100000"/>
-                </a:lnSpc>
-                <a:spcBef>
-                  <a:spcPts val="0"/>
-                </a:spcBef>
-                <a:spcAft>
-                  <a:spcPts val="0"/>
-                </a:spcAft>
-                <a:buClrTx/>
-                <a:buSzTx/>
-                <a:buFontTx/>
-                <a:buNone/>
-                <a:tabLst/>
-                <a:defRPr/>
-              </a:pPr>
-              <a:r>
-                <a:rPr kumimoji="0" lang="en-US" sz="2400" b="1" i="0" u="none" strike="noStrike" kern="1200" cap="none" spc="0" normalizeH="0" baseline="0" noProof="0" dirty="0">
-                  <a:ln>
-                    <a:noFill/>
-                  </a:ln>
-                  <a:solidFill>
-                    <a:prstClr val="black"/>
-                  </a:solidFill>
-                  <a:effectLst/>
-                  <a:uLnTx/>
-                  <a:uFillTx/>
-                  <a:latin typeface="Calibri" panose="020F0502020204030204"/>
-                  <a:ea typeface="+mn-ea"/>
-                  <a:cs typeface="+mn-cs"/>
-                </a:rPr>
-                <a:t>123456789</a:t>
-              </a:r>
-              <a:endParaRPr kumimoji="0" lang="pt-BR" sz="2400" b="1" i="0" u="none" strike="noStrike" kern="1200" cap="none" spc="0" normalizeH="0" baseline="0" noProof="0" dirty="0">
-                <a:ln>
-                  <a:noFill/>
-                </a:ln>
-                <a:solidFill>
-                  <a:prstClr val="black"/>
-                </a:solidFill>
-                <a:effectLst/>
-                <a:uLnTx/>
-                <a:uFillTx/>
-                <a:latin typeface="Calibri" panose="020F0502020204030204"/>
-                <a:ea typeface="+mn-ea"/>
-                <a:cs typeface="+mn-cs"/>
-              </a:endParaRPr>
-            </a:p>
-          </p:txBody>
-        </p:sp>
-        <p:sp>
-          <p:nvSpPr>
-            <p:cNvPr id="62" name="CaixaDeTexto 1">
-              <a:extLst>
-                <a:ext uri="{FF2B5EF4-FFF2-40B4-BE49-F238E27FC236}">
-                  <a16:creationId xmlns:a16="http://schemas.microsoft.com/office/drawing/2014/main" id="{AD69FD20-97B2-B3DF-DCF5-387F32D0C0C5}"/>
-                </a:ext>
-              </a:extLst>
-            </p:cNvPr>
-            <p:cNvSpPr txBox="1"/>
-            <p:nvPr/>
-          </p:nvSpPr>
-          <p:spPr>
-            <a:xfrm>
-              <a:off x="825410" y="2104540"/>
-              <a:ext cx="2380243" cy="366352"/>
-            </a:xfrm>
-            <a:prstGeom prst="rect">
-              <a:avLst/>
-            </a:prstGeom>
-            <a:noFill/>
-          </p:spPr>
-          <p:txBody>
-            <a:bodyPr wrap="square" rtlCol="0">
-              <a:spAutoFit/>
-            </a:bodyPr>
-            <a:lstStyle/>
-            <a:p>
-              <a:pPr marL="0" marR="0" lvl="0" indent="0" algn="ctr" defTabSz="914400" rtl="0" eaLnBrk="1" fontAlgn="auto" latinLnBrk="0" hangingPunct="1">
-                <a:lnSpc>
-                  <a:spcPct val="100000"/>
-                </a:lnSpc>
-                <a:spcBef>
-                  <a:spcPts val="0"/>
-                </a:spcBef>
-                <a:spcAft>
-                  <a:spcPts val="0"/>
-                </a:spcAft>
-                <a:buClrTx/>
-                <a:buSzTx/>
-                <a:buFontTx/>
-                <a:buNone/>
-                <a:tabLst/>
-                <a:defRPr/>
-              </a:pPr>
-              <a:r>
-                <a:rPr kumimoji="0" lang="en-US" sz="1600" b="0" i="0" u="none" strike="noStrike" kern="1200" cap="none" spc="0" normalizeH="0" baseline="0" noProof="0" dirty="0">
-                  <a:ln>
-                    <a:noFill/>
-                  </a:ln>
-                  <a:solidFill>
-                    <a:prstClr val="black"/>
-                  </a:solidFill>
-                  <a:effectLst/>
-                  <a:uLnTx/>
-                  <a:uFillTx/>
-                  <a:latin typeface="Calibri" panose="020F0502020204030204"/>
-                  <a:ea typeface="+mn-ea"/>
-                  <a:cs typeface="+mn-cs"/>
-                </a:rPr>
-                <a:t>Min </a:t>
-              </a:r>
-              <a:r>
-                <a:rPr kumimoji="0" lang="en-US" sz="1600" b="0" i="0" u="none" strike="noStrike" kern="1200" cap="none" spc="0" normalizeH="0" baseline="0" noProof="0" dirty="0" err="1">
-                  <a:ln>
-                    <a:noFill/>
-                  </a:ln>
-                  <a:solidFill>
-                    <a:prstClr val="black"/>
-                  </a:solidFill>
-                  <a:effectLst/>
-                  <a:uLnTx/>
-                  <a:uFillTx/>
-                  <a:latin typeface="Calibri" panose="020F0502020204030204"/>
-                  <a:ea typeface="+mn-ea"/>
-                  <a:cs typeface="+mn-cs"/>
-                </a:rPr>
-                <a:t>Exames</a:t>
-              </a:r>
-              <a:r>
-                <a:rPr kumimoji="0" lang="en-US" sz="1600" b="0" i="0" u="none" strike="noStrike" kern="1200" cap="none" spc="0" normalizeH="0" baseline="0" noProof="0" dirty="0">
-                  <a:ln>
-                    <a:noFill/>
-                  </a:ln>
-                  <a:solidFill>
-                    <a:prstClr val="black"/>
-                  </a:solidFill>
-                  <a:effectLst/>
-                  <a:uLnTx/>
-                  <a:uFillTx/>
-                  <a:latin typeface="Calibri" panose="020F0502020204030204"/>
-                  <a:ea typeface="+mn-ea"/>
-                  <a:cs typeface="+mn-cs"/>
-                </a:rPr>
-                <a:t>/</a:t>
-              </a:r>
-              <a:r>
-                <a:rPr kumimoji="0" lang="en-US" sz="1600" b="0" i="0" u="none" strike="noStrike" kern="1200" cap="none" spc="0" normalizeH="0" baseline="0" noProof="0" dirty="0" err="1">
-                  <a:ln>
-                    <a:noFill/>
-                  </a:ln>
-                  <a:solidFill>
-                    <a:prstClr val="black"/>
-                  </a:solidFill>
-                  <a:effectLst/>
-                  <a:uLnTx/>
-                  <a:uFillTx/>
-                  <a:latin typeface="Calibri" panose="020F0502020204030204"/>
-                  <a:ea typeface="+mn-ea"/>
-                  <a:cs typeface="+mn-cs"/>
-                </a:rPr>
-                <a:t>Funcionário</a:t>
-              </a:r>
-              <a:endParaRPr kumimoji="0" lang="pt-BR" sz="1600" b="0" i="0" u="none" strike="noStrike" kern="1200" cap="none" spc="0" normalizeH="0" baseline="0" noProof="0" dirty="0">
-                <a:ln>
-                  <a:noFill/>
-                </a:ln>
-                <a:solidFill>
-                  <a:prstClr val="black"/>
-                </a:solidFill>
-                <a:effectLst/>
-                <a:uLnTx/>
-                <a:uFillTx/>
-                <a:latin typeface="Calibri" panose="020F0502020204030204"/>
-                <a:ea typeface="+mn-ea"/>
-                <a:cs typeface="+mn-cs"/>
-              </a:endParaRPr>
-            </a:p>
-          </p:txBody>
-        </p:sp>
-      </p:grpSp>
-      <p:grpSp>
-        <p:nvGrpSpPr>
-          <p:cNvPr id="67" name="Agrupar 66">
-            <a:extLst>
-              <a:ext uri="{FF2B5EF4-FFF2-40B4-BE49-F238E27FC236}">
-                <a16:creationId xmlns:a16="http://schemas.microsoft.com/office/drawing/2014/main" id="{7EDDA6C2-F3F3-56EB-3AFE-3CD7EDD6B88E}"/>
-              </a:ext>
-            </a:extLst>
-          </p:cNvPr>
-          <p:cNvGrpSpPr/>
-          <p:nvPr/>
-        </p:nvGrpSpPr>
-        <p:grpSpPr>
-          <a:xfrm>
-            <a:off x="8913580" y="2953035"/>
-            <a:ext cx="2555068" cy="1325176"/>
-            <a:chOff x="678267" y="1156137"/>
-            <a:chExt cx="2716575" cy="1433983"/>
-          </a:xfrm>
-        </p:grpSpPr>
-        <p:sp>
-          <p:nvSpPr>
-            <p:cNvPr id="68" name="Retângulo: Cantos Arredondados 67">
-              <a:extLst>
-                <a:ext uri="{FF2B5EF4-FFF2-40B4-BE49-F238E27FC236}">
-                  <a16:creationId xmlns:a16="http://schemas.microsoft.com/office/drawing/2014/main" id="{E1806637-EB9C-A652-6ACF-34A8D49C493A}"/>
-                </a:ext>
-              </a:extLst>
-            </p:cNvPr>
-            <p:cNvSpPr/>
-            <p:nvPr/>
-          </p:nvSpPr>
-          <p:spPr>
-            <a:xfrm>
-              <a:off x="678267" y="1156137"/>
-              <a:ext cx="2716575" cy="1433983"/>
-            </a:xfrm>
-            <a:prstGeom prst="roundRect">
-              <a:avLst/>
-            </a:prstGeom>
-            <a:solidFill>
-              <a:srgbClr val="EEEFEA"/>
-            </a:solidFill>
-            <a:ln>
-              <a:noFill/>
-            </a:ln>
-          </p:spPr>
-          <p:style>
-            <a:lnRef idx="2">
-              <a:schemeClr val="accent1">
-                <a:shade val="50000"/>
-              </a:schemeClr>
-            </a:lnRef>
-            <a:fillRef idx="1">
-              <a:schemeClr val="accent1"/>
-            </a:fillRef>
-            <a:effectRef idx="0">
-              <a:schemeClr val="accent1"/>
-            </a:effectRef>
-            <a:fontRef idx="minor">
-              <a:schemeClr val="lt1"/>
-            </a:fontRef>
-          </p:style>
-          <p:txBody>
-            <a:bodyPr rtlCol="0" anchor="ctr"/>
-            <a:lstStyle/>
-            <a:p>
-              <a:pPr marL="0" marR="0" lvl="0" indent="0" algn="ctr" defTabSz="914400" rtl="0" eaLnBrk="1" fontAlgn="auto" latinLnBrk="0" hangingPunct="1">
-                <a:lnSpc>
-                  <a:spcPct val="100000"/>
-                </a:lnSpc>
-                <a:spcBef>
-                  <a:spcPts val="0"/>
-                </a:spcBef>
-                <a:spcAft>
-                  <a:spcPts val="0"/>
-                </a:spcAft>
-                <a:buClrTx/>
-                <a:buSzTx/>
-                <a:buFontTx/>
-                <a:buNone/>
-                <a:tabLst/>
-                <a:defRPr/>
-              </a:pPr>
-              <a:endParaRPr kumimoji="0" lang="pt-BR" sz="1800" b="0" i="0" u="none" strike="noStrike" kern="1200" cap="none" spc="0" normalizeH="0" baseline="0" noProof="0">
-                <a:ln>
-                  <a:noFill/>
-                </a:ln>
-                <a:solidFill>
-                  <a:srgbClr val="A5A5A5">
-                    <a:lumMod val="20000"/>
-                    <a:lumOff val="80000"/>
-                  </a:srgbClr>
-                </a:solidFill>
-                <a:effectLst/>
-                <a:uLnTx/>
-                <a:uFillTx/>
-                <a:latin typeface="Calibri" panose="020F0502020204030204"/>
-                <a:ea typeface="+mn-ea"/>
-                <a:cs typeface="+mn-cs"/>
-              </a:endParaRPr>
-            </a:p>
-          </p:txBody>
-        </p:sp>
-        <p:sp>
-          <p:nvSpPr>
-            <p:cNvPr id="69" name="CaixaDeTexto 2">
-              <a:extLst>
-                <a:ext uri="{FF2B5EF4-FFF2-40B4-BE49-F238E27FC236}">
-                  <a16:creationId xmlns:a16="http://schemas.microsoft.com/office/drawing/2014/main" id="{97E350EE-DB02-E839-4828-20590C557AE4}"/>
-                </a:ext>
-              </a:extLst>
-            </p:cNvPr>
-            <p:cNvSpPr txBox="1"/>
-            <p:nvPr/>
-          </p:nvSpPr>
-          <p:spPr>
-            <a:xfrm>
-              <a:off x="678267" y="1285079"/>
-              <a:ext cx="2716575" cy="499571"/>
-            </a:xfrm>
-            <a:prstGeom prst="rect">
-              <a:avLst/>
-            </a:prstGeom>
-            <a:noFill/>
-          </p:spPr>
-          <p:txBody>
-            <a:bodyPr wrap="square" rtlCol="0">
-              <a:spAutoFit/>
-            </a:bodyPr>
-            <a:lstStyle/>
-            <a:p>
-              <a:pPr marL="0" marR="0" lvl="0" indent="0" algn="ctr" defTabSz="914400" rtl="0" eaLnBrk="1" fontAlgn="auto" latinLnBrk="0" hangingPunct="1">
-                <a:lnSpc>
-                  <a:spcPct val="100000"/>
-                </a:lnSpc>
-                <a:spcBef>
-                  <a:spcPts val="0"/>
-                </a:spcBef>
-                <a:spcAft>
-                  <a:spcPts val="0"/>
-                </a:spcAft>
-                <a:buClrTx/>
-                <a:buSzTx/>
-                <a:buFontTx/>
-                <a:buNone/>
-                <a:tabLst/>
-                <a:defRPr/>
-              </a:pPr>
-              <a:r>
-                <a:rPr kumimoji="0" lang="en-US" sz="2400" b="1" i="0" u="none" strike="noStrike" kern="1200" cap="none" spc="0" normalizeH="0" baseline="0" noProof="0" dirty="0">
-                  <a:ln>
-                    <a:noFill/>
-                  </a:ln>
-                  <a:solidFill>
-                    <a:prstClr val="black"/>
-                  </a:solidFill>
-                  <a:effectLst/>
-                  <a:uLnTx/>
-                  <a:uFillTx/>
-                  <a:latin typeface="Calibri" panose="020F0502020204030204"/>
-                  <a:ea typeface="+mn-ea"/>
-                  <a:cs typeface="+mn-cs"/>
-                </a:rPr>
-                <a:t>123456789</a:t>
-              </a:r>
-              <a:endParaRPr kumimoji="0" lang="pt-BR" sz="2400" b="1" i="0" u="none" strike="noStrike" kern="1200" cap="none" spc="0" normalizeH="0" baseline="0" noProof="0" dirty="0">
-                <a:ln>
-                  <a:noFill/>
-                </a:ln>
-                <a:solidFill>
-                  <a:prstClr val="black"/>
-                </a:solidFill>
-                <a:effectLst/>
-                <a:uLnTx/>
-                <a:uFillTx/>
-                <a:latin typeface="Calibri" panose="020F0502020204030204"/>
-                <a:ea typeface="+mn-ea"/>
-                <a:cs typeface="+mn-cs"/>
-              </a:endParaRPr>
-            </a:p>
-          </p:txBody>
-        </p:sp>
-        <p:sp>
-          <p:nvSpPr>
-            <p:cNvPr id="70" name="CaixaDeTexto 1">
-              <a:extLst>
-                <a:ext uri="{FF2B5EF4-FFF2-40B4-BE49-F238E27FC236}">
-                  <a16:creationId xmlns:a16="http://schemas.microsoft.com/office/drawing/2014/main" id="{D39743E8-01F2-6816-8CE4-D6FB259385BB}"/>
-                </a:ext>
-              </a:extLst>
-            </p:cNvPr>
-            <p:cNvSpPr txBox="1"/>
-            <p:nvPr/>
-          </p:nvSpPr>
-          <p:spPr>
-            <a:xfrm>
-              <a:off x="825410" y="2104540"/>
-              <a:ext cx="2380243" cy="366352"/>
-            </a:xfrm>
-            <a:prstGeom prst="rect">
-              <a:avLst/>
-            </a:prstGeom>
-            <a:noFill/>
-          </p:spPr>
-          <p:txBody>
-            <a:bodyPr wrap="square" rtlCol="0">
-              <a:spAutoFit/>
-            </a:bodyPr>
-            <a:lstStyle/>
-            <a:p>
-              <a:pPr marL="0" marR="0" lvl="0" indent="0" algn="ctr" defTabSz="914400" rtl="0" eaLnBrk="1" fontAlgn="auto" latinLnBrk="0" hangingPunct="1">
-                <a:lnSpc>
-                  <a:spcPct val="100000"/>
-                </a:lnSpc>
-                <a:spcBef>
-                  <a:spcPts val="0"/>
-                </a:spcBef>
-                <a:spcAft>
-                  <a:spcPts val="0"/>
-                </a:spcAft>
-                <a:buClrTx/>
-                <a:buSzTx/>
-                <a:buFontTx/>
-                <a:buNone/>
-                <a:tabLst/>
-                <a:defRPr/>
-              </a:pPr>
-              <a:r>
-                <a:rPr kumimoji="0" lang="en-US" sz="1600" b="0" i="0" u="none" strike="noStrike" kern="1200" cap="none" spc="0" normalizeH="0" baseline="0" noProof="0" dirty="0" err="1">
-                  <a:ln>
-                    <a:noFill/>
-                  </a:ln>
-                  <a:solidFill>
-                    <a:prstClr val="black"/>
-                  </a:solidFill>
-                  <a:effectLst/>
-                  <a:uLnTx/>
-                  <a:uFillTx/>
-                  <a:latin typeface="Calibri" panose="020F0502020204030204"/>
-                  <a:ea typeface="+mn-ea"/>
-                  <a:cs typeface="+mn-cs"/>
-                </a:rPr>
-                <a:t>Média</a:t>
-              </a:r>
-              <a:r>
-                <a:rPr kumimoji="0" lang="en-US" sz="1600" b="0" i="0" u="none" strike="noStrike" kern="1200" cap="none" spc="0" normalizeH="0" baseline="0" noProof="0" dirty="0">
-                  <a:ln>
-                    <a:noFill/>
-                  </a:ln>
-                  <a:solidFill>
-                    <a:prstClr val="black"/>
-                  </a:solidFill>
-                  <a:effectLst/>
-                  <a:uLnTx/>
-                  <a:uFillTx/>
-                  <a:latin typeface="Calibri" panose="020F0502020204030204"/>
-                  <a:ea typeface="+mn-ea"/>
-                  <a:cs typeface="+mn-cs"/>
-                </a:rPr>
-                <a:t> </a:t>
-              </a:r>
-              <a:r>
-                <a:rPr kumimoji="0" lang="en-US" sz="1600" b="0" i="0" u="none" strike="noStrike" kern="1200" cap="none" spc="0" normalizeH="0" baseline="0" noProof="0" dirty="0" err="1">
-                  <a:ln>
-                    <a:noFill/>
-                  </a:ln>
-                  <a:solidFill>
-                    <a:prstClr val="black"/>
-                  </a:solidFill>
-                  <a:effectLst/>
-                  <a:uLnTx/>
-                  <a:uFillTx/>
-                  <a:latin typeface="Calibri" panose="020F0502020204030204"/>
-                  <a:ea typeface="+mn-ea"/>
-                  <a:cs typeface="+mn-cs"/>
-                </a:rPr>
-                <a:t>Exames</a:t>
-              </a:r>
-              <a:r>
-                <a:rPr kumimoji="0" lang="en-US" sz="1600" b="0" i="0" u="none" strike="noStrike" kern="1200" cap="none" spc="0" normalizeH="0" baseline="0" noProof="0" dirty="0">
-                  <a:ln>
-                    <a:noFill/>
-                  </a:ln>
-                  <a:solidFill>
-                    <a:prstClr val="black"/>
-                  </a:solidFill>
-                  <a:effectLst/>
-                  <a:uLnTx/>
-                  <a:uFillTx/>
-                  <a:latin typeface="Calibri" panose="020F0502020204030204"/>
-                  <a:ea typeface="+mn-ea"/>
-                  <a:cs typeface="+mn-cs"/>
-                </a:rPr>
-                <a:t>/</a:t>
-              </a:r>
-              <a:r>
-                <a:rPr kumimoji="0" lang="en-US" sz="1600" b="0" i="0" u="none" strike="noStrike" kern="1200" cap="none" spc="0" normalizeH="0" baseline="0" noProof="0" dirty="0" err="1">
-                  <a:ln>
-                    <a:noFill/>
-                  </a:ln>
-                  <a:solidFill>
-                    <a:prstClr val="black"/>
-                  </a:solidFill>
-                  <a:effectLst/>
-                  <a:uLnTx/>
-                  <a:uFillTx/>
-                  <a:latin typeface="Calibri" panose="020F0502020204030204"/>
-                  <a:ea typeface="+mn-ea"/>
-                  <a:cs typeface="+mn-cs"/>
-                </a:rPr>
-                <a:t>Unidade</a:t>
-              </a:r>
-              <a:endParaRPr kumimoji="0" lang="pt-BR" sz="1600" b="0" i="0" u="none" strike="noStrike" kern="1200" cap="none" spc="0" normalizeH="0" baseline="0" noProof="0" dirty="0">
-                <a:ln>
-                  <a:noFill/>
-                </a:ln>
-                <a:solidFill>
-                  <a:prstClr val="black"/>
-                </a:solidFill>
-                <a:effectLst/>
-                <a:uLnTx/>
-                <a:uFillTx/>
-                <a:latin typeface="Calibri" panose="020F0502020204030204"/>
-                <a:ea typeface="+mn-ea"/>
-                <a:cs typeface="+mn-cs"/>
-              </a:endParaRPr>
-            </a:p>
-          </p:txBody>
-        </p:sp>
-      </p:grpSp>
-      <p:grpSp>
-        <p:nvGrpSpPr>
-          <p:cNvPr id="75" name="Agrupar 74">
-            <a:extLst>
-              <a:ext uri="{FF2B5EF4-FFF2-40B4-BE49-F238E27FC236}">
-                <a16:creationId xmlns:a16="http://schemas.microsoft.com/office/drawing/2014/main" id="{5CA0CACD-C8E8-E14A-AA86-FA86BC2040A0}"/>
-              </a:ext>
-            </a:extLst>
-          </p:cNvPr>
-          <p:cNvGrpSpPr/>
-          <p:nvPr/>
-        </p:nvGrpSpPr>
-        <p:grpSpPr>
-          <a:xfrm>
-            <a:off x="723352" y="4988662"/>
-            <a:ext cx="2555068" cy="1325176"/>
-            <a:chOff x="678267" y="1156137"/>
-            <a:chExt cx="2716575" cy="1433983"/>
-          </a:xfrm>
-        </p:grpSpPr>
-        <p:sp>
-          <p:nvSpPr>
-            <p:cNvPr id="76" name="Retângulo: Cantos Arredondados 75">
-              <a:extLst>
-                <a:ext uri="{FF2B5EF4-FFF2-40B4-BE49-F238E27FC236}">
-                  <a16:creationId xmlns:a16="http://schemas.microsoft.com/office/drawing/2014/main" id="{36EABB60-CB6B-8E0F-3C79-5435CD6660C4}"/>
-                </a:ext>
-              </a:extLst>
-            </p:cNvPr>
-            <p:cNvSpPr/>
-            <p:nvPr/>
-          </p:nvSpPr>
-          <p:spPr>
-            <a:xfrm>
-              <a:off x="678267" y="1156137"/>
-              <a:ext cx="2716575" cy="1433983"/>
-            </a:xfrm>
-            <a:prstGeom prst="roundRect">
-              <a:avLst/>
-            </a:prstGeom>
-            <a:solidFill>
-              <a:srgbClr val="EEEFEA"/>
-            </a:solidFill>
-            <a:ln>
-              <a:noFill/>
-            </a:ln>
-          </p:spPr>
-          <p:style>
-            <a:lnRef idx="2">
-              <a:schemeClr val="accent1">
-                <a:shade val="50000"/>
-              </a:schemeClr>
-            </a:lnRef>
-            <a:fillRef idx="1">
-              <a:schemeClr val="accent1"/>
-            </a:fillRef>
-            <a:effectRef idx="0">
-              <a:schemeClr val="accent1"/>
-            </a:effectRef>
-            <a:fontRef idx="minor">
-              <a:schemeClr val="lt1"/>
-            </a:fontRef>
-          </p:style>
-          <p:txBody>
-            <a:bodyPr rtlCol="0" anchor="ctr"/>
-            <a:lstStyle/>
-            <a:p>
-              <a:pPr marL="0" marR="0" lvl="0" indent="0" algn="ctr" defTabSz="914400" rtl="0" eaLnBrk="1" fontAlgn="auto" latinLnBrk="0" hangingPunct="1">
-                <a:lnSpc>
-                  <a:spcPct val="100000"/>
-                </a:lnSpc>
-                <a:spcBef>
-                  <a:spcPts val="0"/>
-                </a:spcBef>
-                <a:spcAft>
-                  <a:spcPts val="0"/>
-                </a:spcAft>
-                <a:buClrTx/>
-                <a:buSzTx/>
-                <a:buFontTx/>
-                <a:buNone/>
-                <a:tabLst/>
-                <a:defRPr/>
-              </a:pPr>
-              <a:endParaRPr kumimoji="0" lang="pt-BR" sz="1800" b="0" i="0" u="none" strike="noStrike" kern="1200" cap="none" spc="0" normalizeH="0" baseline="0" noProof="0">
-                <a:ln>
-                  <a:noFill/>
-                </a:ln>
-                <a:solidFill>
-                  <a:srgbClr val="A5A5A5">
-                    <a:lumMod val="20000"/>
-                    <a:lumOff val="80000"/>
-                  </a:srgbClr>
-                </a:solidFill>
-                <a:effectLst/>
-                <a:uLnTx/>
-                <a:uFillTx/>
-                <a:latin typeface="Calibri" panose="020F0502020204030204"/>
-                <a:ea typeface="+mn-ea"/>
-                <a:cs typeface="+mn-cs"/>
-              </a:endParaRPr>
-            </a:p>
-          </p:txBody>
-        </p:sp>
-        <p:sp>
-          <p:nvSpPr>
-            <p:cNvPr id="77" name="CaixaDeTexto 2">
-              <a:extLst>
-                <a:ext uri="{FF2B5EF4-FFF2-40B4-BE49-F238E27FC236}">
-                  <a16:creationId xmlns:a16="http://schemas.microsoft.com/office/drawing/2014/main" id="{CC1CCD25-442A-2BFC-374D-7BC2651D44CD}"/>
-                </a:ext>
-              </a:extLst>
-            </p:cNvPr>
-            <p:cNvSpPr txBox="1"/>
-            <p:nvPr/>
-          </p:nvSpPr>
-          <p:spPr>
-            <a:xfrm>
-              <a:off x="678267" y="1285079"/>
-              <a:ext cx="2716575" cy="499571"/>
-            </a:xfrm>
-            <a:prstGeom prst="rect">
-              <a:avLst/>
-            </a:prstGeom>
-            <a:noFill/>
-          </p:spPr>
-          <p:txBody>
-            <a:bodyPr wrap="square" rtlCol="0">
-              <a:spAutoFit/>
-            </a:bodyPr>
-            <a:lstStyle/>
-            <a:p>
-              <a:pPr marL="0" marR="0" lvl="0" indent="0" algn="ctr" defTabSz="914400" rtl="0" eaLnBrk="1" fontAlgn="auto" latinLnBrk="0" hangingPunct="1">
-                <a:lnSpc>
-                  <a:spcPct val="100000"/>
-                </a:lnSpc>
-                <a:spcBef>
-                  <a:spcPts val="0"/>
-                </a:spcBef>
-                <a:spcAft>
-                  <a:spcPts val="0"/>
-                </a:spcAft>
-                <a:buClrTx/>
-                <a:buSzTx/>
-                <a:buFontTx/>
-                <a:buNone/>
-                <a:tabLst/>
-                <a:defRPr/>
-              </a:pPr>
-              <a:r>
-                <a:rPr kumimoji="0" lang="en-US" sz="2400" b="1" i="0" u="none" strike="noStrike" kern="1200" cap="none" spc="0" normalizeH="0" baseline="0" noProof="0" dirty="0">
-                  <a:ln>
-                    <a:noFill/>
-                  </a:ln>
-                  <a:solidFill>
-                    <a:prstClr val="black"/>
-                  </a:solidFill>
-                  <a:effectLst/>
-                  <a:uLnTx/>
-                  <a:uFillTx/>
-                  <a:latin typeface="Calibri" panose="020F0502020204030204"/>
-                  <a:ea typeface="+mn-ea"/>
-                  <a:cs typeface="+mn-cs"/>
-                </a:rPr>
-                <a:t>123456789</a:t>
-              </a:r>
-              <a:endParaRPr kumimoji="0" lang="pt-BR" sz="2400" b="1" i="0" u="none" strike="noStrike" kern="1200" cap="none" spc="0" normalizeH="0" baseline="0" noProof="0" dirty="0">
-                <a:ln>
-                  <a:noFill/>
-                </a:ln>
-                <a:solidFill>
-                  <a:prstClr val="black"/>
-                </a:solidFill>
-                <a:effectLst/>
-                <a:uLnTx/>
-                <a:uFillTx/>
-                <a:latin typeface="Calibri" panose="020F0502020204030204"/>
-                <a:ea typeface="+mn-ea"/>
-                <a:cs typeface="+mn-cs"/>
-              </a:endParaRPr>
-            </a:p>
-          </p:txBody>
-        </p:sp>
-        <p:sp>
-          <p:nvSpPr>
-            <p:cNvPr id="78" name="CaixaDeTexto 1">
-              <a:extLst>
-                <a:ext uri="{FF2B5EF4-FFF2-40B4-BE49-F238E27FC236}">
-                  <a16:creationId xmlns:a16="http://schemas.microsoft.com/office/drawing/2014/main" id="{4427B42E-0A17-1C9D-7E1F-72754B6C7A2C}"/>
-                </a:ext>
-              </a:extLst>
-            </p:cNvPr>
-            <p:cNvSpPr txBox="1"/>
-            <p:nvPr/>
-          </p:nvSpPr>
-          <p:spPr>
-            <a:xfrm>
-              <a:off x="825410" y="2104540"/>
-              <a:ext cx="2380243" cy="399657"/>
-            </a:xfrm>
-            <a:prstGeom prst="rect">
-              <a:avLst/>
-            </a:prstGeom>
-            <a:noFill/>
-          </p:spPr>
-          <p:txBody>
-            <a:bodyPr wrap="square" rtlCol="0">
-              <a:spAutoFit/>
-            </a:bodyPr>
-            <a:lstStyle/>
-            <a:p>
-              <a:pPr marL="0" marR="0" lvl="0" indent="0" algn="ctr" defTabSz="914400" rtl="0" eaLnBrk="1" fontAlgn="auto" latinLnBrk="0" hangingPunct="1">
-                <a:lnSpc>
-                  <a:spcPct val="100000"/>
-                </a:lnSpc>
-                <a:spcBef>
-                  <a:spcPts val="0"/>
-                </a:spcBef>
-                <a:spcAft>
-                  <a:spcPts val="0"/>
-                </a:spcAft>
-                <a:buClrTx/>
-                <a:buSzTx/>
-                <a:buFontTx/>
-                <a:buNone/>
-                <a:tabLst/>
-                <a:defRPr/>
-              </a:pPr>
-              <a:r>
-                <a:rPr kumimoji="0" lang="en-US" sz="1800" b="0" i="0" u="none" strike="noStrike" kern="1200" cap="none" spc="0" normalizeH="0" baseline="0" noProof="0" dirty="0" err="1">
-                  <a:ln>
-                    <a:noFill/>
-                  </a:ln>
-                  <a:solidFill>
-                    <a:prstClr val="black"/>
-                  </a:solidFill>
-                  <a:effectLst/>
-                  <a:uLnTx/>
-                  <a:uFillTx/>
-                  <a:latin typeface="Calibri" panose="020F0502020204030204"/>
-                  <a:ea typeface="+mn-ea"/>
-                  <a:cs typeface="+mn-cs"/>
-                </a:rPr>
-                <a:t>Média</a:t>
-              </a:r>
-              <a:r>
-                <a:rPr kumimoji="0" lang="en-US" sz="1800" b="0" i="0" u="none" strike="noStrike" kern="1200" cap="none" spc="0" normalizeH="0" baseline="0" noProof="0" dirty="0">
-                  <a:ln>
-                    <a:noFill/>
-                  </a:ln>
-                  <a:solidFill>
-                    <a:prstClr val="black"/>
-                  </a:solidFill>
-                  <a:effectLst/>
-                  <a:uLnTx/>
-                  <a:uFillTx/>
-                  <a:latin typeface="Calibri" panose="020F0502020204030204"/>
-                  <a:ea typeface="+mn-ea"/>
-                  <a:cs typeface="+mn-cs"/>
-                </a:rPr>
-                <a:t> </a:t>
-              </a:r>
-              <a:r>
-                <a:rPr kumimoji="0" lang="en-US" sz="1800" b="0" i="0" u="none" strike="noStrike" kern="1200" cap="none" spc="0" normalizeH="0" baseline="0" noProof="0" dirty="0" err="1">
-                  <a:ln>
-                    <a:noFill/>
-                  </a:ln>
-                  <a:solidFill>
-                    <a:prstClr val="black"/>
-                  </a:solidFill>
-                  <a:effectLst/>
-                  <a:uLnTx/>
-                  <a:uFillTx/>
-                  <a:latin typeface="Calibri" panose="020F0502020204030204"/>
-                  <a:ea typeface="+mn-ea"/>
-                  <a:cs typeface="+mn-cs"/>
-                </a:rPr>
-                <a:t>Exames</a:t>
-              </a:r>
-              <a:r>
-                <a:rPr kumimoji="0" lang="en-US" sz="1800" b="0" i="0" u="none" strike="noStrike" kern="1200" cap="none" spc="0" normalizeH="0" baseline="0" noProof="0" dirty="0">
-                  <a:ln>
-                    <a:noFill/>
-                  </a:ln>
-                  <a:solidFill>
-                    <a:prstClr val="black"/>
-                  </a:solidFill>
-                  <a:effectLst/>
-                  <a:uLnTx/>
-                  <a:uFillTx/>
-                  <a:latin typeface="Calibri" panose="020F0502020204030204"/>
-                  <a:ea typeface="+mn-ea"/>
-                  <a:cs typeface="+mn-cs"/>
-                </a:rPr>
-                <a:t>/</a:t>
-              </a:r>
-              <a:r>
-                <a:rPr kumimoji="0" lang="en-US" sz="1800" b="0" i="0" u="none" strike="noStrike" kern="1200" cap="none" spc="0" normalizeH="0" baseline="0" noProof="0" dirty="0" err="1">
-                  <a:ln>
-                    <a:noFill/>
-                  </a:ln>
-                  <a:solidFill>
-                    <a:prstClr val="black"/>
-                  </a:solidFill>
-                  <a:effectLst/>
-                  <a:uLnTx/>
-                  <a:uFillTx/>
-                  <a:latin typeface="Calibri" panose="020F0502020204030204"/>
-                  <a:ea typeface="+mn-ea"/>
-                  <a:cs typeface="+mn-cs"/>
-                </a:rPr>
-                <a:t>Setor</a:t>
-              </a:r>
-              <a:endParaRPr kumimoji="0" lang="pt-BR" sz="1800" b="0" i="0" u="none" strike="noStrike" kern="1200" cap="none" spc="0" normalizeH="0" baseline="0" noProof="0" dirty="0">
-                <a:ln>
-                  <a:noFill/>
-                </a:ln>
-                <a:solidFill>
-                  <a:prstClr val="black"/>
-                </a:solidFill>
-                <a:effectLst/>
-                <a:uLnTx/>
-                <a:uFillTx/>
-                <a:latin typeface="Calibri" panose="020F0502020204030204"/>
-                <a:ea typeface="+mn-ea"/>
-                <a:cs typeface="+mn-cs"/>
-              </a:endParaRPr>
-            </a:p>
-          </p:txBody>
-        </p:sp>
-      </p:grpSp>
-      <p:grpSp>
-        <p:nvGrpSpPr>
-          <p:cNvPr id="71" name="Agrupar 70">
-            <a:extLst>
-              <a:ext uri="{FF2B5EF4-FFF2-40B4-BE49-F238E27FC236}">
-                <a16:creationId xmlns:a16="http://schemas.microsoft.com/office/drawing/2014/main" id="{14B86EE4-CFA9-3424-1051-CAC37F93E1CB}"/>
-              </a:ext>
-            </a:extLst>
-          </p:cNvPr>
-          <p:cNvGrpSpPr/>
-          <p:nvPr/>
-        </p:nvGrpSpPr>
-        <p:grpSpPr>
-          <a:xfrm>
-            <a:off x="4818466" y="4988662"/>
-            <a:ext cx="2555068" cy="1325176"/>
-            <a:chOff x="678267" y="1156137"/>
-            <a:chExt cx="2716575" cy="1433983"/>
-          </a:xfrm>
-        </p:grpSpPr>
-        <p:sp>
-          <p:nvSpPr>
-            <p:cNvPr id="72" name="Retângulo: Cantos Arredondados 71">
-              <a:extLst>
-                <a:ext uri="{FF2B5EF4-FFF2-40B4-BE49-F238E27FC236}">
-                  <a16:creationId xmlns:a16="http://schemas.microsoft.com/office/drawing/2014/main" id="{BE6769DB-9104-B1C3-B5D8-90D3B00B81DD}"/>
-                </a:ext>
-              </a:extLst>
-            </p:cNvPr>
-            <p:cNvSpPr/>
-            <p:nvPr/>
-          </p:nvSpPr>
-          <p:spPr>
-            <a:xfrm>
-              <a:off x="678267" y="1156137"/>
-              <a:ext cx="2716575" cy="1433983"/>
-            </a:xfrm>
-            <a:prstGeom prst="roundRect">
-              <a:avLst/>
-            </a:prstGeom>
-            <a:solidFill>
-              <a:srgbClr val="EEEFEA"/>
-            </a:solidFill>
-            <a:ln>
-              <a:noFill/>
-            </a:ln>
-          </p:spPr>
-          <p:style>
-            <a:lnRef idx="2">
-              <a:schemeClr val="accent1">
-                <a:shade val="50000"/>
-              </a:schemeClr>
-            </a:lnRef>
-            <a:fillRef idx="1">
-              <a:schemeClr val="accent1"/>
-            </a:fillRef>
-            <a:effectRef idx="0">
-              <a:schemeClr val="accent1"/>
-            </a:effectRef>
-            <a:fontRef idx="minor">
-              <a:schemeClr val="lt1"/>
-            </a:fontRef>
-          </p:style>
-          <p:txBody>
-            <a:bodyPr rtlCol="0" anchor="ctr"/>
-            <a:lstStyle/>
-            <a:p>
-              <a:pPr marL="0" marR="0" lvl="0" indent="0" algn="ctr" defTabSz="914400" rtl="0" eaLnBrk="1" fontAlgn="auto" latinLnBrk="0" hangingPunct="1">
-                <a:lnSpc>
-                  <a:spcPct val="100000"/>
-                </a:lnSpc>
-                <a:spcBef>
-                  <a:spcPts val="0"/>
-                </a:spcBef>
-                <a:spcAft>
-                  <a:spcPts val="0"/>
-                </a:spcAft>
-                <a:buClrTx/>
-                <a:buSzTx/>
-                <a:buFontTx/>
-                <a:buNone/>
-                <a:tabLst/>
-                <a:defRPr/>
-              </a:pPr>
-              <a:endParaRPr kumimoji="0" lang="pt-BR" sz="1800" b="0" i="0" u="none" strike="noStrike" kern="1200" cap="none" spc="0" normalizeH="0" baseline="0" noProof="0">
-                <a:ln>
-                  <a:noFill/>
-                </a:ln>
-                <a:solidFill>
-                  <a:srgbClr val="A5A5A5">
-                    <a:lumMod val="20000"/>
-                    <a:lumOff val="80000"/>
-                  </a:srgbClr>
-                </a:solidFill>
-                <a:effectLst/>
-                <a:uLnTx/>
-                <a:uFillTx/>
-                <a:latin typeface="Calibri" panose="020F0502020204030204"/>
-                <a:ea typeface="+mn-ea"/>
-                <a:cs typeface="+mn-cs"/>
-              </a:endParaRPr>
-            </a:p>
-          </p:txBody>
-        </p:sp>
-        <p:sp>
-          <p:nvSpPr>
-            <p:cNvPr id="73" name="CaixaDeTexto 2">
-              <a:extLst>
-                <a:ext uri="{FF2B5EF4-FFF2-40B4-BE49-F238E27FC236}">
-                  <a16:creationId xmlns:a16="http://schemas.microsoft.com/office/drawing/2014/main" id="{779DDFB8-7FC2-B3DF-2489-D0AC68BC38FD}"/>
-                </a:ext>
-              </a:extLst>
-            </p:cNvPr>
-            <p:cNvSpPr txBox="1"/>
-            <p:nvPr/>
-          </p:nvSpPr>
-          <p:spPr>
-            <a:xfrm>
-              <a:off x="678267" y="1285079"/>
-              <a:ext cx="2716575" cy="499571"/>
-            </a:xfrm>
-            <a:prstGeom prst="rect">
-              <a:avLst/>
-            </a:prstGeom>
-            <a:noFill/>
-          </p:spPr>
-          <p:txBody>
-            <a:bodyPr wrap="square" rtlCol="0">
-              <a:spAutoFit/>
-            </a:bodyPr>
-            <a:lstStyle/>
-            <a:p>
-              <a:pPr marL="0" marR="0" lvl="0" indent="0" algn="ctr" defTabSz="914400" rtl="0" eaLnBrk="1" fontAlgn="auto" latinLnBrk="0" hangingPunct="1">
-                <a:lnSpc>
-                  <a:spcPct val="100000"/>
-                </a:lnSpc>
-                <a:spcBef>
-                  <a:spcPts val="0"/>
-                </a:spcBef>
-                <a:spcAft>
-                  <a:spcPts val="0"/>
-                </a:spcAft>
-                <a:buClrTx/>
-                <a:buSzTx/>
-                <a:buFontTx/>
-                <a:buNone/>
-                <a:tabLst/>
-                <a:defRPr/>
-              </a:pPr>
-              <a:r>
-                <a:rPr kumimoji="0" lang="en-US" sz="2400" b="1" i="0" u="none" strike="noStrike" kern="1200" cap="none" spc="0" normalizeH="0" baseline="0" noProof="0" dirty="0">
-                  <a:ln>
-                    <a:noFill/>
-                  </a:ln>
-                  <a:solidFill>
-                    <a:prstClr val="black"/>
-                  </a:solidFill>
-                  <a:effectLst/>
-                  <a:uLnTx/>
-                  <a:uFillTx/>
-                  <a:latin typeface="Calibri" panose="020F0502020204030204"/>
-                  <a:ea typeface="+mn-ea"/>
-                  <a:cs typeface="+mn-cs"/>
-                </a:rPr>
-                <a:t>123456789</a:t>
-              </a:r>
-              <a:endParaRPr kumimoji="0" lang="pt-BR" sz="2400" b="1" i="0" u="none" strike="noStrike" kern="1200" cap="none" spc="0" normalizeH="0" baseline="0" noProof="0" dirty="0">
-                <a:ln>
-                  <a:noFill/>
-                </a:ln>
-                <a:solidFill>
-                  <a:prstClr val="black"/>
-                </a:solidFill>
-                <a:effectLst/>
-                <a:uLnTx/>
-                <a:uFillTx/>
-                <a:latin typeface="Calibri" panose="020F0502020204030204"/>
-                <a:ea typeface="+mn-ea"/>
-                <a:cs typeface="+mn-cs"/>
-              </a:endParaRPr>
-            </a:p>
-          </p:txBody>
-        </p:sp>
-        <p:sp>
-          <p:nvSpPr>
-            <p:cNvPr id="74" name="CaixaDeTexto 1">
-              <a:extLst>
-                <a:ext uri="{FF2B5EF4-FFF2-40B4-BE49-F238E27FC236}">
-                  <a16:creationId xmlns:a16="http://schemas.microsoft.com/office/drawing/2014/main" id="{03381C34-55BB-E023-A241-56E241937CB6}"/>
-                </a:ext>
-              </a:extLst>
-            </p:cNvPr>
-            <p:cNvSpPr txBox="1"/>
-            <p:nvPr/>
-          </p:nvSpPr>
-          <p:spPr>
-            <a:xfrm>
-              <a:off x="825410" y="2104540"/>
-              <a:ext cx="2380243" cy="399657"/>
-            </a:xfrm>
-            <a:prstGeom prst="rect">
-              <a:avLst/>
-            </a:prstGeom>
-            <a:noFill/>
-          </p:spPr>
-          <p:txBody>
-            <a:bodyPr wrap="square" rtlCol="0">
-              <a:spAutoFit/>
-            </a:bodyPr>
-            <a:lstStyle/>
-            <a:p>
-              <a:pPr marL="0" marR="0" lvl="0" indent="0" algn="ctr" defTabSz="914400" rtl="0" eaLnBrk="1" fontAlgn="auto" latinLnBrk="0" hangingPunct="1">
-                <a:lnSpc>
-                  <a:spcPct val="100000"/>
-                </a:lnSpc>
-                <a:spcBef>
-                  <a:spcPts val="0"/>
-                </a:spcBef>
-                <a:spcAft>
-                  <a:spcPts val="0"/>
-                </a:spcAft>
-                <a:buClrTx/>
-                <a:buSzTx/>
-                <a:buFontTx/>
-                <a:buNone/>
-                <a:tabLst/>
-                <a:defRPr/>
-              </a:pPr>
-              <a:r>
-                <a:rPr kumimoji="0" lang="en-US" sz="1800" b="0" i="0" u="none" strike="noStrike" kern="1200" cap="none" spc="0" normalizeH="0" baseline="0" noProof="0" dirty="0" err="1">
-                  <a:ln>
-                    <a:noFill/>
-                  </a:ln>
-                  <a:solidFill>
-                    <a:prstClr val="black"/>
-                  </a:solidFill>
-                  <a:effectLst/>
-                  <a:uLnTx/>
-                  <a:uFillTx/>
-                  <a:latin typeface="Calibri" panose="020F0502020204030204"/>
-                  <a:ea typeface="+mn-ea"/>
-                  <a:cs typeface="+mn-cs"/>
-                </a:rPr>
-                <a:t>Média</a:t>
-              </a:r>
-              <a:r>
-                <a:rPr kumimoji="0" lang="en-US" sz="1800" b="0" i="0" u="none" strike="noStrike" kern="1200" cap="none" spc="0" normalizeH="0" baseline="0" noProof="0" dirty="0">
-                  <a:ln>
-                    <a:noFill/>
-                  </a:ln>
-                  <a:solidFill>
-                    <a:prstClr val="black"/>
-                  </a:solidFill>
-                  <a:effectLst/>
-                  <a:uLnTx/>
-                  <a:uFillTx/>
-                  <a:latin typeface="Calibri" panose="020F0502020204030204"/>
-                  <a:ea typeface="+mn-ea"/>
-                  <a:cs typeface="+mn-cs"/>
-                </a:rPr>
-                <a:t> </a:t>
-              </a:r>
-              <a:r>
-                <a:rPr kumimoji="0" lang="en-US" sz="1800" b="0" i="0" u="none" strike="noStrike" kern="1200" cap="none" spc="0" normalizeH="0" baseline="0" noProof="0" dirty="0" err="1">
-                  <a:ln>
-                    <a:noFill/>
-                  </a:ln>
-                  <a:solidFill>
-                    <a:prstClr val="black"/>
-                  </a:solidFill>
-                  <a:effectLst/>
-                  <a:uLnTx/>
-                  <a:uFillTx/>
-                  <a:latin typeface="Calibri" panose="020F0502020204030204"/>
-                  <a:ea typeface="+mn-ea"/>
-                  <a:cs typeface="+mn-cs"/>
-                </a:rPr>
-                <a:t>Exames</a:t>
-              </a:r>
-              <a:r>
-                <a:rPr kumimoji="0" lang="en-US" sz="1800" b="0" i="0" u="none" strike="noStrike" kern="1200" cap="none" spc="0" normalizeH="0" baseline="0" noProof="0" dirty="0">
-                  <a:ln>
-                    <a:noFill/>
-                  </a:ln>
-                  <a:solidFill>
-                    <a:prstClr val="black"/>
-                  </a:solidFill>
-                  <a:effectLst/>
-                  <a:uLnTx/>
-                  <a:uFillTx/>
-                  <a:latin typeface="Calibri" panose="020F0502020204030204"/>
-                  <a:ea typeface="+mn-ea"/>
-                  <a:cs typeface="+mn-cs"/>
-                </a:rPr>
-                <a:t>/Cargo</a:t>
-              </a:r>
-              <a:endParaRPr kumimoji="0" lang="pt-BR" sz="1800" b="0" i="0" u="none" strike="noStrike" kern="1200" cap="none" spc="0" normalizeH="0" baseline="0" noProof="0" dirty="0">
-                <a:ln>
-                  <a:noFill/>
-                </a:ln>
-                <a:solidFill>
-                  <a:prstClr val="black"/>
-                </a:solidFill>
-                <a:effectLst/>
-                <a:uLnTx/>
-                <a:uFillTx/>
-                <a:latin typeface="Calibri" panose="020F0502020204030204"/>
-                <a:ea typeface="+mn-ea"/>
-                <a:cs typeface="+mn-cs"/>
-              </a:endParaRPr>
-            </a:p>
-          </p:txBody>
-        </p:sp>
-      </p:grpSp>
     </p:spTree>
     <p:extLst>
       <p:ext uri="{BB962C8B-B14F-4D97-AF65-F5344CB8AC3E}">
@@ -7425,931 +5888,6 @@
           </a:prstGeom>
         </p:spPr>
       </p:pic>
-      <p:grpSp>
-        <p:nvGrpSpPr>
-          <p:cNvPr id="2" name="Agrupar 1">
-            <a:extLst>
-              <a:ext uri="{FF2B5EF4-FFF2-40B4-BE49-F238E27FC236}">
-                <a16:creationId xmlns:a16="http://schemas.microsoft.com/office/drawing/2014/main" id="{9107EA37-BA77-B53D-8D0F-363FA02FFF4B}"/>
-              </a:ext>
-            </a:extLst>
-          </p:cNvPr>
-          <p:cNvGrpSpPr/>
-          <p:nvPr/>
-        </p:nvGrpSpPr>
-        <p:grpSpPr>
-          <a:xfrm>
-            <a:off x="985432" y="1082129"/>
-            <a:ext cx="2555068" cy="1325176"/>
-            <a:chOff x="678267" y="1156137"/>
-            <a:chExt cx="2716575" cy="1433983"/>
-          </a:xfrm>
-        </p:grpSpPr>
-        <p:sp>
-          <p:nvSpPr>
-            <p:cNvPr id="3" name="Retângulo: Cantos Arredondados 2">
-              <a:extLst>
-                <a:ext uri="{FF2B5EF4-FFF2-40B4-BE49-F238E27FC236}">
-                  <a16:creationId xmlns:a16="http://schemas.microsoft.com/office/drawing/2014/main" id="{4E8E4D6C-FD67-1352-19A9-8E225F470E4F}"/>
-                </a:ext>
-              </a:extLst>
-            </p:cNvPr>
-            <p:cNvSpPr/>
-            <p:nvPr/>
-          </p:nvSpPr>
-          <p:spPr>
-            <a:xfrm>
-              <a:off x="678267" y="1156137"/>
-              <a:ext cx="2716575" cy="1433983"/>
-            </a:xfrm>
-            <a:prstGeom prst="roundRect">
-              <a:avLst/>
-            </a:prstGeom>
-            <a:solidFill>
-              <a:srgbClr val="EEEFEA"/>
-            </a:solidFill>
-            <a:ln>
-              <a:noFill/>
-            </a:ln>
-          </p:spPr>
-          <p:style>
-            <a:lnRef idx="2">
-              <a:schemeClr val="accent1">
-                <a:shade val="50000"/>
-              </a:schemeClr>
-            </a:lnRef>
-            <a:fillRef idx="1">
-              <a:schemeClr val="accent1"/>
-            </a:fillRef>
-            <a:effectRef idx="0">
-              <a:schemeClr val="accent1"/>
-            </a:effectRef>
-            <a:fontRef idx="minor">
-              <a:schemeClr val="lt1"/>
-            </a:fontRef>
-          </p:style>
-          <p:txBody>
-            <a:bodyPr rtlCol="0" anchor="ctr"/>
-            <a:lstStyle/>
-            <a:p>
-              <a:pPr marL="0" marR="0" lvl="0" indent="0" algn="ctr" defTabSz="914400" rtl="0" eaLnBrk="1" fontAlgn="auto" latinLnBrk="0" hangingPunct="1">
-                <a:lnSpc>
-                  <a:spcPct val="100000"/>
-                </a:lnSpc>
-                <a:spcBef>
-                  <a:spcPts val="0"/>
-                </a:spcBef>
-                <a:spcAft>
-                  <a:spcPts val="0"/>
-                </a:spcAft>
-                <a:buClrTx/>
-                <a:buSzTx/>
-                <a:buFontTx/>
-                <a:buNone/>
-                <a:tabLst/>
-                <a:defRPr/>
-              </a:pPr>
-              <a:endParaRPr kumimoji="0" lang="pt-BR" sz="1800" b="0" i="0" u="none" strike="noStrike" kern="1200" cap="none" spc="0" normalizeH="0" baseline="0" noProof="0">
-                <a:ln>
-                  <a:noFill/>
-                </a:ln>
-                <a:solidFill>
-                  <a:srgbClr val="A5A5A5">
-                    <a:lumMod val="20000"/>
-                    <a:lumOff val="80000"/>
-                  </a:srgbClr>
-                </a:solidFill>
-                <a:effectLst/>
-                <a:uLnTx/>
-                <a:uFillTx/>
-                <a:latin typeface="Calibri" panose="020F0502020204030204"/>
-                <a:ea typeface="+mn-ea"/>
-                <a:cs typeface="+mn-cs"/>
-              </a:endParaRPr>
-            </a:p>
-          </p:txBody>
-        </p:sp>
-        <p:sp>
-          <p:nvSpPr>
-            <p:cNvPr id="6" name="CaixaDeTexto 2">
-              <a:extLst>
-                <a:ext uri="{FF2B5EF4-FFF2-40B4-BE49-F238E27FC236}">
-                  <a16:creationId xmlns:a16="http://schemas.microsoft.com/office/drawing/2014/main" id="{624B0CA5-CB4A-51A6-CF9F-7858250A7779}"/>
-                </a:ext>
-              </a:extLst>
-            </p:cNvPr>
-            <p:cNvSpPr txBox="1"/>
-            <p:nvPr/>
-          </p:nvSpPr>
-          <p:spPr>
-            <a:xfrm>
-              <a:off x="678267" y="1285079"/>
-              <a:ext cx="2716575" cy="499571"/>
-            </a:xfrm>
-            <a:prstGeom prst="rect">
-              <a:avLst/>
-            </a:prstGeom>
-            <a:noFill/>
-          </p:spPr>
-          <p:txBody>
-            <a:bodyPr wrap="square" rtlCol="0">
-              <a:spAutoFit/>
-            </a:bodyPr>
-            <a:lstStyle/>
-            <a:p>
-              <a:pPr marL="0" marR="0" lvl="0" indent="0" algn="ctr" defTabSz="914400" rtl="0" eaLnBrk="1" fontAlgn="auto" latinLnBrk="0" hangingPunct="1">
-                <a:lnSpc>
-                  <a:spcPct val="100000"/>
-                </a:lnSpc>
-                <a:spcBef>
-                  <a:spcPts val="0"/>
-                </a:spcBef>
-                <a:spcAft>
-                  <a:spcPts val="0"/>
-                </a:spcAft>
-                <a:buClrTx/>
-                <a:buSzTx/>
-                <a:buFontTx/>
-                <a:buNone/>
-                <a:tabLst/>
-                <a:defRPr/>
-              </a:pPr>
-              <a:r>
-                <a:rPr kumimoji="0" lang="en-US" sz="2400" b="1" i="0" u="none" strike="noStrike" kern="1200" cap="none" spc="0" normalizeH="0" baseline="0" noProof="0" dirty="0">
-                  <a:ln>
-                    <a:noFill/>
-                  </a:ln>
-                  <a:solidFill>
-                    <a:prstClr val="black"/>
-                  </a:solidFill>
-                  <a:effectLst/>
-                  <a:uLnTx/>
-                  <a:uFillTx/>
-                  <a:latin typeface="Calibri" panose="020F0502020204030204"/>
-                  <a:ea typeface="+mn-ea"/>
-                  <a:cs typeface="+mn-cs"/>
-                </a:rPr>
-                <a:t>123456789</a:t>
-              </a:r>
-              <a:endParaRPr kumimoji="0" lang="pt-BR" sz="2400" b="1" i="0" u="none" strike="noStrike" kern="1200" cap="none" spc="0" normalizeH="0" baseline="0" noProof="0" dirty="0">
-                <a:ln>
-                  <a:noFill/>
-                </a:ln>
-                <a:solidFill>
-                  <a:prstClr val="black"/>
-                </a:solidFill>
-                <a:effectLst/>
-                <a:uLnTx/>
-                <a:uFillTx/>
-                <a:latin typeface="Calibri" panose="020F0502020204030204"/>
-                <a:ea typeface="+mn-ea"/>
-                <a:cs typeface="+mn-cs"/>
-              </a:endParaRPr>
-            </a:p>
-          </p:txBody>
-        </p:sp>
-        <p:sp>
-          <p:nvSpPr>
-            <p:cNvPr id="7" name="CaixaDeTexto 1">
-              <a:extLst>
-                <a:ext uri="{FF2B5EF4-FFF2-40B4-BE49-F238E27FC236}">
-                  <a16:creationId xmlns:a16="http://schemas.microsoft.com/office/drawing/2014/main" id="{462168C6-1B0A-465A-8219-B90ECF66ED68}"/>
-                </a:ext>
-              </a:extLst>
-            </p:cNvPr>
-            <p:cNvSpPr txBox="1"/>
-            <p:nvPr/>
-          </p:nvSpPr>
-          <p:spPr>
-            <a:xfrm>
-              <a:off x="825410" y="2104540"/>
-              <a:ext cx="2380243" cy="399657"/>
-            </a:xfrm>
-            <a:prstGeom prst="rect">
-              <a:avLst/>
-            </a:prstGeom>
-            <a:noFill/>
-          </p:spPr>
-          <p:txBody>
-            <a:bodyPr wrap="square" rtlCol="0">
-              <a:spAutoFit/>
-            </a:bodyPr>
-            <a:lstStyle/>
-            <a:p>
-              <a:pPr marL="0" marR="0" lvl="0" indent="0" algn="ctr" defTabSz="914400" rtl="0" eaLnBrk="1" fontAlgn="auto" latinLnBrk="0" hangingPunct="1">
-                <a:lnSpc>
-                  <a:spcPct val="100000"/>
-                </a:lnSpc>
-                <a:spcBef>
-                  <a:spcPts val="0"/>
-                </a:spcBef>
-                <a:spcAft>
-                  <a:spcPts val="0"/>
-                </a:spcAft>
-                <a:buClrTx/>
-                <a:buSzTx/>
-                <a:buFontTx/>
-                <a:buNone/>
-                <a:tabLst/>
-                <a:defRPr/>
-              </a:pPr>
-              <a:r>
-                <a:rPr kumimoji="0" lang="en-US" sz="1800" b="0" i="0" u="none" strike="noStrike" kern="1200" cap="none" spc="0" normalizeH="0" baseline="0" noProof="0" dirty="0" err="1">
-                  <a:ln>
-                    <a:noFill/>
-                  </a:ln>
-                  <a:solidFill>
-                    <a:prstClr val="black"/>
-                  </a:solidFill>
-                  <a:effectLst/>
-                  <a:uLnTx/>
-                  <a:uFillTx/>
-                  <a:latin typeface="Calibri" panose="020F0502020204030204"/>
-                  <a:ea typeface="+mn-ea"/>
-                  <a:cs typeface="+mn-cs"/>
-                </a:rPr>
-                <a:t>Média</a:t>
-              </a:r>
-              <a:r>
-                <a:rPr kumimoji="0" lang="en-US" sz="1800" b="0" i="0" u="none" strike="noStrike" kern="1200" cap="none" spc="0" normalizeH="0" baseline="0" noProof="0" dirty="0">
-                  <a:ln>
-                    <a:noFill/>
-                  </a:ln>
-                  <a:solidFill>
-                    <a:prstClr val="black"/>
-                  </a:solidFill>
-                  <a:effectLst/>
-                  <a:uLnTx/>
-                  <a:uFillTx/>
-                  <a:latin typeface="Calibri" panose="020F0502020204030204"/>
-                  <a:ea typeface="+mn-ea"/>
-                  <a:cs typeface="+mn-cs"/>
-                </a:rPr>
-                <a:t> </a:t>
-              </a:r>
-              <a:r>
-                <a:rPr kumimoji="0" lang="en-US" sz="1800" b="0" i="0" u="none" strike="noStrike" kern="1200" cap="none" spc="0" normalizeH="0" baseline="0" noProof="0" dirty="0" err="1">
-                  <a:ln>
-                    <a:noFill/>
-                  </a:ln>
-                  <a:solidFill>
-                    <a:prstClr val="black"/>
-                  </a:solidFill>
-                  <a:effectLst/>
-                  <a:uLnTx/>
-                  <a:uFillTx/>
-                  <a:latin typeface="Calibri" panose="020F0502020204030204"/>
-                  <a:ea typeface="+mn-ea"/>
-                  <a:cs typeface="+mn-cs"/>
-                </a:rPr>
-                <a:t>Exames</a:t>
-              </a:r>
-              <a:r>
-                <a:rPr kumimoji="0" lang="en-US" sz="1800" b="0" i="0" u="none" strike="noStrike" kern="1200" cap="none" spc="0" normalizeH="0" baseline="0" noProof="0" dirty="0">
-                  <a:ln>
-                    <a:noFill/>
-                  </a:ln>
-                  <a:solidFill>
-                    <a:prstClr val="black"/>
-                  </a:solidFill>
-                  <a:effectLst/>
-                  <a:uLnTx/>
-                  <a:uFillTx/>
-                  <a:latin typeface="Calibri" panose="020F0502020204030204"/>
-                  <a:ea typeface="+mn-ea"/>
-                  <a:cs typeface="+mn-cs"/>
-                </a:rPr>
-                <a:t>/Data</a:t>
-              </a:r>
-              <a:endParaRPr kumimoji="0" lang="pt-BR" sz="1800" b="0" i="0" u="none" strike="noStrike" kern="1200" cap="none" spc="0" normalizeH="0" baseline="0" noProof="0" dirty="0">
-                <a:ln>
-                  <a:noFill/>
-                </a:ln>
-                <a:solidFill>
-                  <a:prstClr val="black"/>
-                </a:solidFill>
-                <a:effectLst/>
-                <a:uLnTx/>
-                <a:uFillTx/>
-                <a:latin typeface="Calibri" panose="020F0502020204030204"/>
-                <a:ea typeface="+mn-ea"/>
-                <a:cs typeface="+mn-cs"/>
-              </a:endParaRPr>
-            </a:p>
-          </p:txBody>
-        </p:sp>
-      </p:grpSp>
-      <p:grpSp>
-        <p:nvGrpSpPr>
-          <p:cNvPr id="8" name="Agrupar 7">
-            <a:extLst>
-              <a:ext uri="{FF2B5EF4-FFF2-40B4-BE49-F238E27FC236}">
-                <a16:creationId xmlns:a16="http://schemas.microsoft.com/office/drawing/2014/main" id="{93541CCB-7A09-6458-C159-D220AF73F8DF}"/>
-              </a:ext>
-            </a:extLst>
-          </p:cNvPr>
-          <p:cNvGrpSpPr/>
-          <p:nvPr/>
-        </p:nvGrpSpPr>
-        <p:grpSpPr>
-          <a:xfrm>
-            <a:off x="4818466" y="1082129"/>
-            <a:ext cx="2555068" cy="1325176"/>
-            <a:chOff x="678267" y="1156137"/>
-            <a:chExt cx="2716575" cy="1433983"/>
-          </a:xfrm>
-        </p:grpSpPr>
-        <p:sp>
-          <p:nvSpPr>
-            <p:cNvPr id="9" name="Retângulo: Cantos Arredondados 8">
-              <a:extLst>
-                <a:ext uri="{FF2B5EF4-FFF2-40B4-BE49-F238E27FC236}">
-                  <a16:creationId xmlns:a16="http://schemas.microsoft.com/office/drawing/2014/main" id="{280211BC-2D62-7841-62BC-F2E4AFA2AE6D}"/>
-                </a:ext>
-              </a:extLst>
-            </p:cNvPr>
-            <p:cNvSpPr/>
-            <p:nvPr/>
-          </p:nvSpPr>
-          <p:spPr>
-            <a:xfrm>
-              <a:off x="678267" y="1156137"/>
-              <a:ext cx="2716575" cy="1433983"/>
-            </a:xfrm>
-            <a:prstGeom prst="roundRect">
-              <a:avLst/>
-            </a:prstGeom>
-            <a:solidFill>
-              <a:srgbClr val="EEEFEA"/>
-            </a:solidFill>
-            <a:ln>
-              <a:noFill/>
-            </a:ln>
-          </p:spPr>
-          <p:style>
-            <a:lnRef idx="2">
-              <a:schemeClr val="accent1">
-                <a:shade val="50000"/>
-              </a:schemeClr>
-            </a:lnRef>
-            <a:fillRef idx="1">
-              <a:schemeClr val="accent1"/>
-            </a:fillRef>
-            <a:effectRef idx="0">
-              <a:schemeClr val="accent1"/>
-            </a:effectRef>
-            <a:fontRef idx="minor">
-              <a:schemeClr val="lt1"/>
-            </a:fontRef>
-          </p:style>
-          <p:txBody>
-            <a:bodyPr rtlCol="0" anchor="ctr"/>
-            <a:lstStyle/>
-            <a:p>
-              <a:pPr marL="0" marR="0" lvl="0" indent="0" algn="ctr" defTabSz="914400" rtl="0" eaLnBrk="1" fontAlgn="auto" latinLnBrk="0" hangingPunct="1">
-                <a:lnSpc>
-                  <a:spcPct val="100000"/>
-                </a:lnSpc>
-                <a:spcBef>
-                  <a:spcPts val="0"/>
-                </a:spcBef>
-                <a:spcAft>
-                  <a:spcPts val="0"/>
-                </a:spcAft>
-                <a:buClrTx/>
-                <a:buSzTx/>
-                <a:buFontTx/>
-                <a:buNone/>
-                <a:tabLst/>
-                <a:defRPr/>
-              </a:pPr>
-              <a:endParaRPr kumimoji="0" lang="pt-BR" sz="1800" b="0" i="0" u="none" strike="noStrike" kern="1200" cap="none" spc="0" normalizeH="0" baseline="0" noProof="0">
-                <a:ln>
-                  <a:noFill/>
-                </a:ln>
-                <a:solidFill>
-                  <a:srgbClr val="A5A5A5">
-                    <a:lumMod val="20000"/>
-                    <a:lumOff val="80000"/>
-                  </a:srgbClr>
-                </a:solidFill>
-                <a:effectLst/>
-                <a:uLnTx/>
-                <a:uFillTx/>
-                <a:latin typeface="Calibri" panose="020F0502020204030204"/>
-                <a:ea typeface="+mn-ea"/>
-                <a:cs typeface="+mn-cs"/>
-              </a:endParaRPr>
-            </a:p>
-          </p:txBody>
-        </p:sp>
-        <p:sp>
-          <p:nvSpPr>
-            <p:cNvPr id="12" name="CaixaDeTexto 2">
-              <a:extLst>
-                <a:ext uri="{FF2B5EF4-FFF2-40B4-BE49-F238E27FC236}">
-                  <a16:creationId xmlns:a16="http://schemas.microsoft.com/office/drawing/2014/main" id="{7FA6F626-FF91-1F46-E80D-3A3BA0F57B54}"/>
-                </a:ext>
-              </a:extLst>
-            </p:cNvPr>
-            <p:cNvSpPr txBox="1"/>
-            <p:nvPr/>
-          </p:nvSpPr>
-          <p:spPr>
-            <a:xfrm>
-              <a:off x="678267" y="1285079"/>
-              <a:ext cx="2716575" cy="499571"/>
-            </a:xfrm>
-            <a:prstGeom prst="rect">
-              <a:avLst/>
-            </a:prstGeom>
-            <a:noFill/>
-          </p:spPr>
-          <p:txBody>
-            <a:bodyPr wrap="square" rtlCol="0">
-              <a:spAutoFit/>
-            </a:bodyPr>
-            <a:lstStyle/>
-            <a:p>
-              <a:pPr marL="0" marR="0" lvl="0" indent="0" algn="ctr" defTabSz="914400" rtl="0" eaLnBrk="1" fontAlgn="auto" latinLnBrk="0" hangingPunct="1">
-                <a:lnSpc>
-                  <a:spcPct val="100000"/>
-                </a:lnSpc>
-                <a:spcBef>
-                  <a:spcPts val="0"/>
-                </a:spcBef>
-                <a:spcAft>
-                  <a:spcPts val="0"/>
-                </a:spcAft>
-                <a:buClrTx/>
-                <a:buSzTx/>
-                <a:buFontTx/>
-                <a:buNone/>
-                <a:tabLst/>
-                <a:defRPr/>
-              </a:pPr>
-              <a:r>
-                <a:rPr kumimoji="0" lang="en-US" sz="2400" b="1" i="0" u="none" strike="noStrike" kern="1200" cap="none" spc="0" normalizeH="0" baseline="0" noProof="0" dirty="0">
-                  <a:ln>
-                    <a:noFill/>
-                  </a:ln>
-                  <a:solidFill>
-                    <a:prstClr val="black"/>
-                  </a:solidFill>
-                  <a:effectLst/>
-                  <a:uLnTx/>
-                  <a:uFillTx/>
-                  <a:latin typeface="Calibri" panose="020F0502020204030204"/>
-                  <a:ea typeface="+mn-ea"/>
-                  <a:cs typeface="+mn-cs"/>
-                </a:rPr>
-                <a:t>123456789</a:t>
-              </a:r>
-              <a:endParaRPr kumimoji="0" lang="pt-BR" sz="2400" b="1" i="0" u="none" strike="noStrike" kern="1200" cap="none" spc="0" normalizeH="0" baseline="0" noProof="0" dirty="0">
-                <a:ln>
-                  <a:noFill/>
-                </a:ln>
-                <a:solidFill>
-                  <a:prstClr val="black"/>
-                </a:solidFill>
-                <a:effectLst/>
-                <a:uLnTx/>
-                <a:uFillTx/>
-                <a:latin typeface="Calibri" panose="020F0502020204030204"/>
-                <a:ea typeface="+mn-ea"/>
-                <a:cs typeface="+mn-cs"/>
-              </a:endParaRPr>
-            </a:p>
-          </p:txBody>
-        </p:sp>
-        <p:sp>
-          <p:nvSpPr>
-            <p:cNvPr id="13" name="CaixaDeTexto 1">
-              <a:extLst>
-                <a:ext uri="{FF2B5EF4-FFF2-40B4-BE49-F238E27FC236}">
-                  <a16:creationId xmlns:a16="http://schemas.microsoft.com/office/drawing/2014/main" id="{A661121A-C719-1243-7324-567EB8C6F41C}"/>
-                </a:ext>
-              </a:extLst>
-            </p:cNvPr>
-            <p:cNvSpPr txBox="1"/>
-            <p:nvPr/>
-          </p:nvSpPr>
-          <p:spPr>
-            <a:xfrm>
-              <a:off x="825410" y="2104540"/>
-              <a:ext cx="2380243" cy="399657"/>
-            </a:xfrm>
-            <a:prstGeom prst="rect">
-              <a:avLst/>
-            </a:prstGeom>
-            <a:noFill/>
-          </p:spPr>
-          <p:txBody>
-            <a:bodyPr wrap="square" rtlCol="0">
-              <a:spAutoFit/>
-            </a:bodyPr>
-            <a:lstStyle/>
-            <a:p>
-              <a:pPr marL="0" marR="0" lvl="0" indent="0" algn="ctr" defTabSz="914400" rtl="0" eaLnBrk="1" fontAlgn="auto" latinLnBrk="0" hangingPunct="1">
-                <a:lnSpc>
-                  <a:spcPct val="100000"/>
-                </a:lnSpc>
-                <a:spcBef>
-                  <a:spcPts val="0"/>
-                </a:spcBef>
-                <a:spcAft>
-                  <a:spcPts val="0"/>
-                </a:spcAft>
-                <a:buClrTx/>
-                <a:buSzTx/>
-                <a:buFontTx/>
-                <a:buNone/>
-                <a:tabLst/>
-                <a:defRPr/>
-              </a:pPr>
-              <a:r>
-                <a:rPr kumimoji="0" lang="en-US" sz="1800" b="0" i="0" u="none" strike="noStrike" kern="1200" cap="none" spc="0" normalizeH="0" baseline="0" noProof="0" dirty="0">
-                  <a:ln>
-                    <a:noFill/>
-                  </a:ln>
-                  <a:solidFill>
-                    <a:prstClr val="black"/>
-                  </a:solidFill>
-                  <a:effectLst/>
-                  <a:uLnTx/>
-                  <a:uFillTx/>
-                  <a:latin typeface="Calibri" panose="020F0502020204030204"/>
-                  <a:ea typeface="+mn-ea"/>
-                  <a:cs typeface="+mn-cs"/>
-                </a:rPr>
-                <a:t>Min </a:t>
-              </a:r>
-              <a:r>
-                <a:rPr kumimoji="0" lang="en-US" sz="1800" b="0" i="0" u="none" strike="noStrike" kern="1200" cap="none" spc="0" normalizeH="0" baseline="0" noProof="0" dirty="0" err="1">
-                  <a:ln>
-                    <a:noFill/>
-                  </a:ln>
-                  <a:solidFill>
-                    <a:prstClr val="black"/>
-                  </a:solidFill>
-                  <a:effectLst/>
-                  <a:uLnTx/>
-                  <a:uFillTx/>
-                  <a:latin typeface="Calibri" panose="020F0502020204030204"/>
-                  <a:ea typeface="+mn-ea"/>
-                  <a:cs typeface="+mn-cs"/>
-                </a:rPr>
-                <a:t>Exames</a:t>
-              </a:r>
-              <a:r>
-                <a:rPr kumimoji="0" lang="en-US" sz="1800" b="0" i="0" u="none" strike="noStrike" kern="1200" cap="none" spc="0" normalizeH="0" baseline="0" noProof="0" dirty="0">
-                  <a:ln>
-                    <a:noFill/>
-                  </a:ln>
-                  <a:solidFill>
-                    <a:prstClr val="black"/>
-                  </a:solidFill>
-                  <a:effectLst/>
-                  <a:uLnTx/>
-                  <a:uFillTx/>
-                  <a:latin typeface="Calibri" panose="020F0502020204030204"/>
-                  <a:ea typeface="+mn-ea"/>
-                  <a:cs typeface="+mn-cs"/>
-                </a:rPr>
-                <a:t>/Data</a:t>
-              </a:r>
-              <a:endParaRPr kumimoji="0" lang="pt-BR" sz="1800" b="0" i="0" u="none" strike="noStrike" kern="1200" cap="none" spc="0" normalizeH="0" baseline="0" noProof="0" dirty="0">
-                <a:ln>
-                  <a:noFill/>
-                </a:ln>
-                <a:solidFill>
-                  <a:prstClr val="black"/>
-                </a:solidFill>
-                <a:effectLst/>
-                <a:uLnTx/>
-                <a:uFillTx/>
-                <a:latin typeface="Calibri" panose="020F0502020204030204"/>
-                <a:ea typeface="+mn-ea"/>
-                <a:cs typeface="+mn-cs"/>
-              </a:endParaRPr>
-            </a:p>
-          </p:txBody>
-        </p:sp>
-      </p:grpSp>
-      <p:grpSp>
-        <p:nvGrpSpPr>
-          <p:cNvPr id="14" name="Agrupar 13">
-            <a:extLst>
-              <a:ext uri="{FF2B5EF4-FFF2-40B4-BE49-F238E27FC236}">
-                <a16:creationId xmlns:a16="http://schemas.microsoft.com/office/drawing/2014/main" id="{B0B176A8-3FB5-1A44-A913-1A173D7F76CD}"/>
-              </a:ext>
-            </a:extLst>
-          </p:cNvPr>
-          <p:cNvGrpSpPr/>
-          <p:nvPr/>
-        </p:nvGrpSpPr>
-        <p:grpSpPr>
-          <a:xfrm>
-            <a:off x="8651500" y="1082129"/>
-            <a:ext cx="2555068" cy="1325176"/>
-            <a:chOff x="678267" y="1156137"/>
-            <a:chExt cx="2716575" cy="1433983"/>
-          </a:xfrm>
-        </p:grpSpPr>
-        <p:sp>
-          <p:nvSpPr>
-            <p:cNvPr id="15" name="Retângulo: Cantos Arredondados 14">
-              <a:extLst>
-                <a:ext uri="{FF2B5EF4-FFF2-40B4-BE49-F238E27FC236}">
-                  <a16:creationId xmlns:a16="http://schemas.microsoft.com/office/drawing/2014/main" id="{7FA65AFC-1AB6-3375-7680-A618C69F5676}"/>
-                </a:ext>
-              </a:extLst>
-            </p:cNvPr>
-            <p:cNvSpPr/>
-            <p:nvPr/>
-          </p:nvSpPr>
-          <p:spPr>
-            <a:xfrm>
-              <a:off x="678267" y="1156137"/>
-              <a:ext cx="2716575" cy="1433983"/>
-            </a:xfrm>
-            <a:prstGeom prst="roundRect">
-              <a:avLst/>
-            </a:prstGeom>
-            <a:solidFill>
-              <a:srgbClr val="EEEFEA"/>
-            </a:solidFill>
-            <a:ln>
-              <a:noFill/>
-            </a:ln>
-          </p:spPr>
-          <p:style>
-            <a:lnRef idx="2">
-              <a:schemeClr val="accent1">
-                <a:shade val="50000"/>
-              </a:schemeClr>
-            </a:lnRef>
-            <a:fillRef idx="1">
-              <a:schemeClr val="accent1"/>
-            </a:fillRef>
-            <a:effectRef idx="0">
-              <a:schemeClr val="accent1"/>
-            </a:effectRef>
-            <a:fontRef idx="minor">
-              <a:schemeClr val="lt1"/>
-            </a:fontRef>
-          </p:style>
-          <p:txBody>
-            <a:bodyPr rtlCol="0" anchor="ctr"/>
-            <a:lstStyle/>
-            <a:p>
-              <a:pPr marL="0" marR="0" lvl="0" indent="0" algn="ctr" defTabSz="914400" rtl="0" eaLnBrk="1" fontAlgn="auto" latinLnBrk="0" hangingPunct="1">
-                <a:lnSpc>
-                  <a:spcPct val="100000"/>
-                </a:lnSpc>
-                <a:spcBef>
-                  <a:spcPts val="0"/>
-                </a:spcBef>
-                <a:spcAft>
-                  <a:spcPts val="0"/>
-                </a:spcAft>
-                <a:buClrTx/>
-                <a:buSzTx/>
-                <a:buFontTx/>
-                <a:buNone/>
-                <a:tabLst/>
-                <a:defRPr/>
-              </a:pPr>
-              <a:endParaRPr kumimoji="0" lang="pt-BR" sz="1800" b="0" i="0" u="none" strike="noStrike" kern="1200" cap="none" spc="0" normalizeH="0" baseline="0" noProof="0">
-                <a:ln>
-                  <a:noFill/>
-                </a:ln>
-                <a:solidFill>
-                  <a:srgbClr val="A5A5A5">
-                    <a:lumMod val="20000"/>
-                    <a:lumOff val="80000"/>
-                  </a:srgbClr>
-                </a:solidFill>
-                <a:effectLst/>
-                <a:uLnTx/>
-                <a:uFillTx/>
-                <a:latin typeface="Calibri" panose="020F0502020204030204"/>
-                <a:ea typeface="+mn-ea"/>
-                <a:cs typeface="+mn-cs"/>
-              </a:endParaRPr>
-            </a:p>
-          </p:txBody>
-        </p:sp>
-        <p:sp>
-          <p:nvSpPr>
-            <p:cNvPr id="16" name="CaixaDeTexto 2">
-              <a:extLst>
-                <a:ext uri="{FF2B5EF4-FFF2-40B4-BE49-F238E27FC236}">
-                  <a16:creationId xmlns:a16="http://schemas.microsoft.com/office/drawing/2014/main" id="{02710B9A-460D-D790-BBCE-5C88EEEB9178}"/>
-                </a:ext>
-              </a:extLst>
-            </p:cNvPr>
-            <p:cNvSpPr txBox="1"/>
-            <p:nvPr/>
-          </p:nvSpPr>
-          <p:spPr>
-            <a:xfrm>
-              <a:off x="678267" y="1285079"/>
-              <a:ext cx="2716575" cy="499571"/>
-            </a:xfrm>
-            <a:prstGeom prst="rect">
-              <a:avLst/>
-            </a:prstGeom>
-            <a:noFill/>
-          </p:spPr>
-          <p:txBody>
-            <a:bodyPr wrap="square" rtlCol="0">
-              <a:spAutoFit/>
-            </a:bodyPr>
-            <a:lstStyle/>
-            <a:p>
-              <a:pPr marL="0" marR="0" lvl="0" indent="0" algn="ctr" defTabSz="914400" rtl="0" eaLnBrk="1" fontAlgn="auto" latinLnBrk="0" hangingPunct="1">
-                <a:lnSpc>
-                  <a:spcPct val="100000"/>
-                </a:lnSpc>
-                <a:spcBef>
-                  <a:spcPts val="0"/>
-                </a:spcBef>
-                <a:spcAft>
-                  <a:spcPts val="0"/>
-                </a:spcAft>
-                <a:buClrTx/>
-                <a:buSzTx/>
-                <a:buFontTx/>
-                <a:buNone/>
-                <a:tabLst/>
-                <a:defRPr/>
-              </a:pPr>
-              <a:r>
-                <a:rPr kumimoji="0" lang="en-US" sz="2400" b="1" i="0" u="none" strike="noStrike" kern="1200" cap="none" spc="0" normalizeH="0" baseline="0" noProof="0" dirty="0">
-                  <a:ln>
-                    <a:noFill/>
-                  </a:ln>
-                  <a:solidFill>
-                    <a:prstClr val="black"/>
-                  </a:solidFill>
-                  <a:effectLst/>
-                  <a:uLnTx/>
-                  <a:uFillTx/>
-                  <a:latin typeface="Calibri" panose="020F0502020204030204"/>
-                  <a:ea typeface="+mn-ea"/>
-                  <a:cs typeface="+mn-cs"/>
-                </a:rPr>
-                <a:t>123456789</a:t>
-              </a:r>
-              <a:endParaRPr kumimoji="0" lang="pt-BR" sz="2400" b="1" i="0" u="none" strike="noStrike" kern="1200" cap="none" spc="0" normalizeH="0" baseline="0" noProof="0" dirty="0">
-                <a:ln>
-                  <a:noFill/>
-                </a:ln>
-                <a:solidFill>
-                  <a:prstClr val="black"/>
-                </a:solidFill>
-                <a:effectLst/>
-                <a:uLnTx/>
-                <a:uFillTx/>
-                <a:latin typeface="Calibri" panose="020F0502020204030204"/>
-                <a:ea typeface="+mn-ea"/>
-                <a:cs typeface="+mn-cs"/>
-              </a:endParaRPr>
-            </a:p>
-          </p:txBody>
-        </p:sp>
-        <p:sp>
-          <p:nvSpPr>
-            <p:cNvPr id="17" name="CaixaDeTexto 1">
-              <a:extLst>
-                <a:ext uri="{FF2B5EF4-FFF2-40B4-BE49-F238E27FC236}">
-                  <a16:creationId xmlns:a16="http://schemas.microsoft.com/office/drawing/2014/main" id="{6B45D934-1F73-3F05-85D0-7FF95F165CDD}"/>
-                </a:ext>
-              </a:extLst>
-            </p:cNvPr>
-            <p:cNvSpPr txBox="1"/>
-            <p:nvPr/>
-          </p:nvSpPr>
-          <p:spPr>
-            <a:xfrm>
-              <a:off x="825410" y="2104540"/>
-              <a:ext cx="2380243" cy="399657"/>
-            </a:xfrm>
-            <a:prstGeom prst="rect">
-              <a:avLst/>
-            </a:prstGeom>
-            <a:noFill/>
-          </p:spPr>
-          <p:txBody>
-            <a:bodyPr wrap="square" rtlCol="0">
-              <a:spAutoFit/>
-            </a:bodyPr>
-            <a:lstStyle/>
-            <a:p>
-              <a:pPr marL="0" marR="0" lvl="0" indent="0" algn="ctr" defTabSz="914400" rtl="0" eaLnBrk="1" fontAlgn="auto" latinLnBrk="0" hangingPunct="1">
-                <a:lnSpc>
-                  <a:spcPct val="100000"/>
-                </a:lnSpc>
-                <a:spcBef>
-                  <a:spcPts val="0"/>
-                </a:spcBef>
-                <a:spcAft>
-                  <a:spcPts val="0"/>
-                </a:spcAft>
-                <a:buClrTx/>
-                <a:buSzTx/>
-                <a:buFontTx/>
-                <a:buNone/>
-                <a:tabLst/>
-                <a:defRPr/>
-              </a:pPr>
-              <a:r>
-                <a:rPr kumimoji="0" lang="en-US" sz="1800" b="0" i="0" u="none" strike="noStrike" kern="1200" cap="none" spc="0" normalizeH="0" baseline="0" noProof="0" dirty="0" err="1">
-                  <a:ln>
-                    <a:noFill/>
-                  </a:ln>
-                  <a:solidFill>
-                    <a:prstClr val="black"/>
-                  </a:solidFill>
-                  <a:effectLst/>
-                  <a:uLnTx/>
-                  <a:uFillTx/>
-                  <a:latin typeface="Calibri" panose="020F0502020204030204"/>
-                  <a:ea typeface="+mn-ea"/>
-                  <a:cs typeface="+mn-cs"/>
-                </a:rPr>
-                <a:t>Máx</a:t>
-              </a:r>
-              <a:r>
-                <a:rPr kumimoji="0" lang="en-US" sz="1800" b="0" i="0" u="none" strike="noStrike" kern="1200" cap="none" spc="0" normalizeH="0" baseline="0" noProof="0" dirty="0">
-                  <a:ln>
-                    <a:noFill/>
-                  </a:ln>
-                  <a:solidFill>
-                    <a:prstClr val="black"/>
-                  </a:solidFill>
-                  <a:effectLst/>
-                  <a:uLnTx/>
-                  <a:uFillTx/>
-                  <a:latin typeface="Calibri" panose="020F0502020204030204"/>
-                  <a:ea typeface="+mn-ea"/>
-                  <a:cs typeface="+mn-cs"/>
-                </a:rPr>
-                <a:t> </a:t>
-              </a:r>
-              <a:r>
-                <a:rPr kumimoji="0" lang="en-US" sz="1800" b="0" i="0" u="none" strike="noStrike" kern="1200" cap="none" spc="0" normalizeH="0" baseline="0" noProof="0" dirty="0" err="1">
-                  <a:ln>
-                    <a:noFill/>
-                  </a:ln>
-                  <a:solidFill>
-                    <a:prstClr val="black"/>
-                  </a:solidFill>
-                  <a:effectLst/>
-                  <a:uLnTx/>
-                  <a:uFillTx/>
-                  <a:latin typeface="Calibri" panose="020F0502020204030204"/>
-                  <a:ea typeface="+mn-ea"/>
-                  <a:cs typeface="+mn-cs"/>
-                </a:rPr>
-                <a:t>Exames</a:t>
-              </a:r>
-              <a:r>
-                <a:rPr kumimoji="0" lang="en-US" sz="1800" b="0" i="0" u="none" strike="noStrike" kern="1200" cap="none" spc="0" normalizeH="0" baseline="0" noProof="0" dirty="0">
-                  <a:ln>
-                    <a:noFill/>
-                  </a:ln>
-                  <a:solidFill>
-                    <a:prstClr val="black"/>
-                  </a:solidFill>
-                  <a:effectLst/>
-                  <a:uLnTx/>
-                  <a:uFillTx/>
-                  <a:latin typeface="Calibri" panose="020F0502020204030204"/>
-                  <a:ea typeface="+mn-ea"/>
-                  <a:cs typeface="+mn-cs"/>
-                </a:rPr>
-                <a:t>/Data</a:t>
-              </a:r>
-              <a:endParaRPr kumimoji="0" lang="pt-BR" sz="1800" b="0" i="0" u="none" strike="noStrike" kern="1200" cap="none" spc="0" normalizeH="0" baseline="0" noProof="0" dirty="0">
-                <a:ln>
-                  <a:noFill/>
-                </a:ln>
-                <a:solidFill>
-                  <a:prstClr val="black"/>
-                </a:solidFill>
-                <a:effectLst/>
-                <a:uLnTx/>
-                <a:uFillTx/>
-                <a:latin typeface="Calibri" panose="020F0502020204030204"/>
-                <a:ea typeface="+mn-ea"/>
-                <a:cs typeface="+mn-cs"/>
-              </a:endParaRPr>
-            </a:p>
-          </p:txBody>
-        </p:sp>
-      </p:grpSp>
       <p:graphicFrame>
         <p:nvGraphicFramePr>
           <p:cNvPr id="20" name="Gráfico 19">
@@ -8363,14 +5901,14 @@
           <p:nvPr>
             <p:extLst>
               <p:ext uri="{D42A27DB-BD31-4B8C-83A1-F6EECF244321}">
-                <p14:modId xmlns:p14="http://schemas.microsoft.com/office/powerpoint/2010/main" val="522463358"/>
+                <p14:modId xmlns:p14="http://schemas.microsoft.com/office/powerpoint/2010/main" val="945599887"/>
               </p:ext>
             </p:extLst>
           </p:nvPr>
         </p:nvGraphicFramePr>
         <p:xfrm>
-          <a:off x="985432" y="2702924"/>
-          <a:ext cx="10221136" cy="3729408"/>
+          <a:off x="985432" y="1273629"/>
+          <a:ext cx="10221136" cy="5158703"/>
         </p:xfrm>
         <a:graphic>
           <a:graphicData uri="http://schemas.openxmlformats.org/drawingml/2006/chart">
@@ -8909,7 +6447,7 @@
           <p:nvPr>
             <p:extLst>
               <p:ext uri="{D42A27DB-BD31-4B8C-83A1-F6EECF244321}">
-                <p14:modId xmlns:p14="http://schemas.microsoft.com/office/powerpoint/2010/main" val="978550919"/>
+                <p14:modId xmlns:p14="http://schemas.microsoft.com/office/powerpoint/2010/main" val="367370097"/>
               </p:ext>
             </p:extLst>
           </p:nvPr>
@@ -14504,14 +12042,14 @@
           <p:nvPr>
             <p:extLst>
               <p:ext uri="{D42A27DB-BD31-4B8C-83A1-F6EECF244321}">
-                <p14:modId xmlns:p14="http://schemas.microsoft.com/office/powerpoint/2010/main" val="2569625171"/>
+                <p14:modId xmlns:p14="http://schemas.microsoft.com/office/powerpoint/2010/main" val="2982825501"/>
               </p:ext>
             </p:extLst>
           </p:nvPr>
         </p:nvGraphicFramePr>
         <p:xfrm>
           <a:off x="609598" y="1168378"/>
-          <a:ext cx="10972803" cy="5129340"/>
+          <a:ext cx="10972804" cy="5129340"/>
         </p:xfrm>
         <a:graphic>
           <a:graphicData uri="http://schemas.openxmlformats.org/drawingml/2006/table">
@@ -14520,10 +12058,17 @@
                 <a:tableStyleId>{8799B23B-EC83-4686-B30A-512413B5E67A}</a:tableStyleId>
               </a:tblPr>
               <a:tblGrid>
-                <a:gridCol w="7421733">
+                <a:gridCol w="6259288">
                   <a:extLst>
                     <a:ext uri="{9D8B030D-6E8A-4147-A177-3AD203B41FA5}">
                       <a16:colId xmlns:a16="http://schemas.microsoft.com/office/drawing/2014/main" val="1967820285"/>
+                    </a:ext>
+                  </a:extLst>
+                </a:gridCol>
+                <a:gridCol w="1162446">
+                  <a:extLst>
+                    <a:ext uri="{9D8B030D-6E8A-4147-A177-3AD203B41FA5}">
+                      <a16:colId xmlns:a16="http://schemas.microsoft.com/office/drawing/2014/main" val="1680309163"/>
                     </a:ext>
                   </a:extLst>
                 </a:gridCol>
@@ -14564,7 +12109,7 @@
                 </a:gridCol>
               </a:tblGrid>
               <a:tr h="424740">
-                <a:tc gridSpan="6">
+                <a:tc gridSpan="7">
                   <a:txBody>
                     <a:bodyPr/>
                     <a:lstStyle/>
@@ -14632,15 +12177,7 @@
                             <a:schemeClr val="bg1"/>
                           </a:solidFill>
                         </a:rPr>
-                        <a:t> </a:t>
-                      </a:r>
-                      <a:r>
-                        <a:rPr lang="en-US" sz="2400" dirty="0" err="1">
-                          <a:solidFill>
-                            <a:schemeClr val="bg1"/>
-                          </a:solidFill>
-                        </a:rPr>
-                        <a:t>Exame</a:t>
+                        <a:t> Exame</a:t>
                       </a:r>
                       <a:endParaRPr lang="pt-BR" sz="2400" dirty="0">
                         <a:solidFill>
@@ -14654,6 +12191,16 @@
                       <a:srgbClr val="A5A5A5"/>
                     </a:solidFill>
                   </a:tcPr>
+                </a:tc>
+                <a:tc hMerge="1">
+                  <a:txBody>
+                    <a:bodyPr/>
+                    <a:lstStyle/>
+                    <a:p>
+                      <a:endParaRPr lang="pt-BR"/>
+                    </a:p>
+                  </a:txBody>
+                  <a:tcPr/>
                 </a:tc>
                 <a:tc hMerge="1">
                   <a:txBody>
@@ -14764,12 +12311,39 @@
                     <a:p>
                       <a:pPr algn="ctr"/>
                       <a:r>
-                        <a:rPr lang="en-US" sz="1800" b="1" dirty="0" err="1">
+                        <a:rPr lang="en-US" sz="1800" b="1" dirty="0">
                           <a:solidFill>
                             <a:schemeClr val="bg1"/>
                           </a:solidFill>
                         </a:rPr>
                         <a:t>Exame</a:t>
+                      </a:r>
+                      <a:endParaRPr lang="pt-BR" b="1" dirty="0">
+                        <a:solidFill>
+                          <a:schemeClr val="bg1"/>
+                        </a:solidFill>
+                      </a:endParaRPr>
+                    </a:p>
+                  </a:txBody>
+                  <a:tcPr anchor="ctr">
+                    <a:solidFill>
+                      <a:srgbClr val="A5A5A5"/>
+                    </a:solidFill>
+                  </a:tcPr>
+                </a:tc>
+                <a:tc>
+                  <a:txBody>
+                    <a:bodyPr/>
+                    <a:lstStyle/>
+                    <a:p>
+                      <a:pPr algn="ctr"/>
+                      <a:r>
+                        <a:rPr lang="en-US" b="1" dirty="0" err="1">
+                          <a:solidFill>
+                            <a:schemeClr val="bg1"/>
+                          </a:solidFill>
+                        </a:rPr>
+                        <a:t>Vencidos</a:t>
                       </a:r>
                       <a:endParaRPr lang="pt-BR" b="1" dirty="0">
                         <a:solidFill>
@@ -14941,6 +12515,16 @@
                     <a:bodyPr/>
                     <a:lstStyle/>
                     <a:p>
+                      <a:endParaRPr lang="pt-BR" sz="1400" dirty="0"/>
+                    </a:p>
+                  </a:txBody>
+                  <a:tcPr anchor="ctr"/>
+                </a:tc>
+                <a:tc>
+                  <a:txBody>
+                    <a:bodyPr/>
+                    <a:lstStyle/>
+                    <a:p>
                       <a:pPr algn="ctr"/>
                       <a:endParaRPr lang="pt-BR" dirty="0"/>
                     </a:p>
@@ -15013,6 +12597,16 @@
                     <a:bodyPr/>
                     <a:lstStyle/>
                     <a:p>
+                      <a:endParaRPr lang="pt-BR" sz="1400" dirty="0"/>
+                    </a:p>
+                  </a:txBody>
+                  <a:tcPr anchor="ctr"/>
+                </a:tc>
+                <a:tc>
+                  <a:txBody>
+                    <a:bodyPr/>
+                    <a:lstStyle/>
+                    <a:p>
                       <a:pPr algn="ctr"/>
                       <a:endParaRPr lang="pt-BR" dirty="0"/>
                     </a:p>
@@ -15085,6 +12679,16 @@
                     <a:bodyPr/>
                     <a:lstStyle/>
                     <a:p>
+                      <a:endParaRPr lang="pt-BR" sz="1400" dirty="0"/>
+                    </a:p>
+                  </a:txBody>
+                  <a:tcPr anchor="ctr"/>
+                </a:tc>
+                <a:tc>
+                  <a:txBody>
+                    <a:bodyPr/>
+                    <a:lstStyle/>
+                    <a:p>
                       <a:pPr algn="ctr"/>
                       <a:endParaRPr lang="pt-BR" dirty="0"/>
                     </a:p>
@@ -15157,6 +12761,16 @@
                     <a:bodyPr/>
                     <a:lstStyle/>
                     <a:p>
+                      <a:endParaRPr lang="pt-BR" sz="1400" dirty="0"/>
+                    </a:p>
+                  </a:txBody>
+                  <a:tcPr anchor="ctr"/>
+                </a:tc>
+                <a:tc>
+                  <a:txBody>
+                    <a:bodyPr/>
+                    <a:lstStyle/>
+                    <a:p>
                       <a:pPr algn="ctr"/>
                       <a:endParaRPr lang="pt-BR" dirty="0"/>
                     </a:p>
@@ -15229,6 +12843,16 @@
                     <a:bodyPr/>
                     <a:lstStyle/>
                     <a:p>
+                      <a:endParaRPr lang="pt-BR" sz="1400" dirty="0"/>
+                    </a:p>
+                  </a:txBody>
+                  <a:tcPr anchor="ctr"/>
+                </a:tc>
+                <a:tc>
+                  <a:txBody>
+                    <a:bodyPr/>
+                    <a:lstStyle/>
+                    <a:p>
                       <a:pPr algn="ctr"/>
                       <a:endParaRPr lang="pt-BR" dirty="0"/>
                     </a:p>
@@ -15301,6 +12925,16 @@
                     <a:bodyPr/>
                     <a:lstStyle/>
                     <a:p>
+                      <a:endParaRPr lang="pt-BR" sz="1400" dirty="0"/>
+                    </a:p>
+                  </a:txBody>
+                  <a:tcPr anchor="ctr"/>
+                </a:tc>
+                <a:tc>
+                  <a:txBody>
+                    <a:bodyPr/>
+                    <a:lstStyle/>
+                    <a:p>
                       <a:pPr algn="ctr"/>
                       <a:endParaRPr lang="pt-BR" dirty="0"/>
                     </a:p>
@@ -15373,6 +13007,16 @@
                     <a:bodyPr/>
                     <a:lstStyle/>
                     <a:p>
+                      <a:endParaRPr lang="pt-BR" sz="1400" dirty="0"/>
+                    </a:p>
+                  </a:txBody>
+                  <a:tcPr anchor="ctr"/>
+                </a:tc>
+                <a:tc>
+                  <a:txBody>
+                    <a:bodyPr/>
+                    <a:lstStyle/>
+                    <a:p>
                       <a:pPr algn="ctr"/>
                       <a:endParaRPr lang="pt-BR" dirty="0"/>
                     </a:p>
@@ -15445,6 +13089,16 @@
                     <a:bodyPr/>
                     <a:lstStyle/>
                     <a:p>
+                      <a:endParaRPr lang="pt-BR" sz="1400" dirty="0"/>
+                    </a:p>
+                  </a:txBody>
+                  <a:tcPr anchor="ctr"/>
+                </a:tc>
+                <a:tc>
+                  <a:txBody>
+                    <a:bodyPr/>
+                    <a:lstStyle/>
+                    <a:p>
                       <a:pPr algn="ctr"/>
                       <a:endParaRPr lang="pt-BR" dirty="0"/>
                     </a:p>
@@ -15517,6 +13171,16 @@
                     <a:bodyPr/>
                     <a:lstStyle/>
                     <a:p>
+                      <a:endParaRPr lang="pt-BR" sz="1400" dirty="0"/>
+                    </a:p>
+                  </a:txBody>
+                  <a:tcPr anchor="ctr"/>
+                </a:tc>
+                <a:tc>
+                  <a:txBody>
+                    <a:bodyPr/>
+                    <a:lstStyle/>
+                    <a:p>
                       <a:pPr algn="ctr"/>
                       <a:endParaRPr lang="pt-BR" dirty="0"/>
                     </a:p>
@@ -15574,6 +13238,16 @@
                 </a:extLst>
               </a:tr>
               <a:tr h="424740">
+                <a:tc>
+                  <a:txBody>
+                    <a:bodyPr/>
+                    <a:lstStyle/>
+                    <a:p>
+                      <a:endParaRPr lang="pt-BR" sz="1400" dirty="0"/>
+                    </a:p>
+                  </a:txBody>
+                  <a:tcPr anchor="ctr"/>
+                </a:tc>
                 <a:tc>
                   <a:txBody>
                     <a:bodyPr/>

</xml_diff>